<commit_message>
Added my SVM slides, System Model, Results, Conclusions, and References
</commit_message>
<xml_diff>
--- a/presentation/DeanQA.pptx
+++ b/presentation/DeanQA.pptx
@@ -7,6 +7,11 @@
   <p:sldIdLst>
     <p:sldId id="256" r:id="rId2"/>
     <p:sldId id="257" r:id="rId3"/>
+    <p:sldId id="260" r:id="rId4"/>
+    <p:sldId id="261" r:id="rId5"/>
+    <p:sldId id="262" r:id="rId6"/>
+    <p:sldId id="263" r:id="rId7"/>
+    <p:sldId id="259" r:id="rId8"/>
   </p:sldIdLst>
   <p:sldSz cx="9144000" cy="6858000" type="screen4x3"/>
   <p:notesSz cx="6858000" cy="9144000"/>
@@ -289,7 +294,7 @@
           <a:p>
             <a:fld id="{B4F56C3E-8310-43F1-8657-0BE50A775DA8}" type="datetimeFigureOut">
               <a:rPr lang="en-US" smtClean="0"/>
-              <a:t>12/8/2011</a:t>
+              <a:t>12/9/2011</a:t>
             </a:fld>
             <a:endParaRPr lang="en-US"/>
           </a:p>
@@ -459,7 +464,7 @@
           <a:p>
             <a:fld id="{B4F56C3E-8310-43F1-8657-0BE50A775DA8}" type="datetimeFigureOut">
               <a:rPr lang="en-US" smtClean="0"/>
-              <a:t>12/8/2011</a:t>
+              <a:t>12/9/2011</a:t>
             </a:fld>
             <a:endParaRPr lang="en-US"/>
           </a:p>
@@ -639,7 +644,7 @@
           <a:p>
             <a:fld id="{B4F56C3E-8310-43F1-8657-0BE50A775DA8}" type="datetimeFigureOut">
               <a:rPr lang="en-US" smtClean="0"/>
-              <a:t>12/8/2011</a:t>
+              <a:t>12/9/2011</a:t>
             </a:fld>
             <a:endParaRPr lang="en-US"/>
           </a:p>
@@ -809,7 +814,7 @@
           <a:p>
             <a:fld id="{B4F56C3E-8310-43F1-8657-0BE50A775DA8}" type="datetimeFigureOut">
               <a:rPr lang="en-US" smtClean="0"/>
-              <a:t>12/8/2011</a:t>
+              <a:t>12/9/2011</a:t>
             </a:fld>
             <a:endParaRPr lang="en-US"/>
           </a:p>
@@ -1055,7 +1060,7 @@
           <a:p>
             <a:fld id="{B4F56C3E-8310-43F1-8657-0BE50A775DA8}" type="datetimeFigureOut">
               <a:rPr lang="en-US" smtClean="0"/>
-              <a:t>12/8/2011</a:t>
+              <a:t>12/9/2011</a:t>
             </a:fld>
             <a:endParaRPr lang="en-US"/>
           </a:p>
@@ -1343,7 +1348,7 @@
           <a:p>
             <a:fld id="{B4F56C3E-8310-43F1-8657-0BE50A775DA8}" type="datetimeFigureOut">
               <a:rPr lang="en-US" smtClean="0"/>
-              <a:t>12/8/2011</a:t>
+              <a:t>12/9/2011</a:t>
             </a:fld>
             <a:endParaRPr lang="en-US"/>
           </a:p>
@@ -1765,7 +1770,7 @@
           <a:p>
             <a:fld id="{B4F56C3E-8310-43F1-8657-0BE50A775DA8}" type="datetimeFigureOut">
               <a:rPr lang="en-US" smtClean="0"/>
-              <a:t>12/8/2011</a:t>
+              <a:t>12/9/2011</a:t>
             </a:fld>
             <a:endParaRPr lang="en-US"/>
           </a:p>
@@ -1883,7 +1888,7 @@
           <a:p>
             <a:fld id="{B4F56C3E-8310-43F1-8657-0BE50A775DA8}" type="datetimeFigureOut">
               <a:rPr lang="en-US" smtClean="0"/>
-              <a:t>12/8/2011</a:t>
+              <a:t>12/9/2011</a:t>
             </a:fld>
             <a:endParaRPr lang="en-US"/>
           </a:p>
@@ -1978,7 +1983,7 @@
           <a:p>
             <a:fld id="{B4F56C3E-8310-43F1-8657-0BE50A775DA8}" type="datetimeFigureOut">
               <a:rPr lang="en-US" smtClean="0"/>
-              <a:t>12/8/2011</a:t>
+              <a:t>12/9/2011</a:t>
             </a:fld>
             <a:endParaRPr lang="en-US"/>
           </a:p>
@@ -2255,7 +2260,7 @@
           <a:p>
             <a:fld id="{B4F56C3E-8310-43F1-8657-0BE50A775DA8}" type="datetimeFigureOut">
               <a:rPr lang="en-US" smtClean="0"/>
-              <a:t>12/8/2011</a:t>
+              <a:t>12/9/2011</a:t>
             </a:fld>
             <a:endParaRPr lang="en-US"/>
           </a:p>
@@ -2512,7 +2517,7 @@
           <a:p>
             <a:fld id="{B4F56C3E-8310-43F1-8657-0BE50A775DA8}" type="datetimeFigureOut">
               <a:rPr lang="en-US" smtClean="0"/>
-              <a:t>12/8/2011</a:t>
+              <a:t>12/9/2011</a:t>
             </a:fld>
             <a:endParaRPr lang="en-US"/>
           </a:p>
@@ -2725,7 +2730,7 @@
           <a:p>
             <a:fld id="{B4F56C3E-8310-43F1-8657-0BE50A775DA8}" type="datetimeFigureOut">
               <a:rPr lang="en-US" smtClean="0"/>
-              <a:t>12/8/2011</a:t>
+              <a:t>12/9/2011</a:t>
             </a:fld>
             <a:endParaRPr lang="en-US"/>
           </a:p>
@@ -3417,7 +3422,7 @@
                 <a:latin typeface="Times New Roman" pitchFamily="18" charset="0"/>
                 <a:cs typeface="Times New Roman" pitchFamily="18" charset="0"/>
               </a:rPr>
-              <a:t>COPY ME TO MAKE NEW SLIDES!</a:t>
+              <a:t>Support Vector Machine Component</a:t>
             </a:r>
             <a:endParaRPr lang="en-US" sz="3200" dirty="0">
               <a:solidFill>
@@ -3452,11 +3457,11 @@
           <a:lstStyle/>
           <a:p>
             <a:r>
-              <a:rPr lang="en-US" sz="2800" dirty="0" smtClean="0">
-                <a:latin typeface="Times New Roman" pitchFamily="18" charset="0"/>
-                <a:cs typeface="Times New Roman" pitchFamily="18" charset="0"/>
-              </a:rPr>
-              <a:t>I’m a bullet point!</a:t>
+              <a:rPr lang="en-US" sz="2400" dirty="0" smtClean="0">
+                <a:latin typeface="Times New Roman" pitchFamily="18" charset="0"/>
+                <a:cs typeface="Times New Roman" pitchFamily="18" charset="0"/>
+              </a:rPr>
+              <a:t>So how about a Machine Learning approach?</a:t>
             </a:r>
             <a:endParaRPr lang="en-US" sz="2400" dirty="0">
               <a:latin typeface="Times New Roman" pitchFamily="18" charset="0"/>
@@ -3464,29 +3469,99 @@
             </a:endParaRPr>
           </a:p>
           <a:p>
+            <a:r>
+              <a:rPr lang="en-US" sz="2400" dirty="0" smtClean="0">
+                <a:latin typeface="Times New Roman" pitchFamily="18" charset="0"/>
+                <a:cs typeface="Times New Roman" pitchFamily="18" charset="0"/>
+              </a:rPr>
+              <a:t>Design a classifier that can predict whether a sentence answers a question or not.</a:t>
+            </a:r>
+          </a:p>
+          <a:p>
             <a:pPr lvl="1"/>
             <a:r>
               <a:rPr lang="en-US" sz="2000" dirty="0" smtClean="0">
                 <a:latin typeface="Times New Roman" pitchFamily="18" charset="0"/>
                 <a:cs typeface="Times New Roman" pitchFamily="18" charset="0"/>
               </a:rPr>
-              <a:t>I’m a </a:t>
+              <a:t>Extract data from training documents, questions, and answers.</a:t>
+            </a:r>
+          </a:p>
+          <a:p>
+            <a:pPr lvl="1"/>
+            <a:r>
+              <a:rPr lang="en-US" sz="2000" dirty="0" smtClean="0">
+                <a:latin typeface="Times New Roman" pitchFamily="18" charset="0"/>
+                <a:cs typeface="Times New Roman" pitchFamily="18" charset="0"/>
+              </a:rPr>
+              <a:t>Every data point is a sentence-question pair with a label if the sentence is the answer to its pair (1) or not (-1)</a:t>
+            </a:r>
+          </a:p>
+          <a:p>
+            <a:pPr lvl="1"/>
+            <a:r>
+              <a:rPr lang="en-US" sz="2000" dirty="0" smtClean="0">
+                <a:latin typeface="Times New Roman" pitchFamily="18" charset="0"/>
+                <a:cs typeface="Times New Roman" pitchFamily="18" charset="0"/>
+              </a:rPr>
+              <a:t>Each feature captures some information from the sentence-question pair (POS, NER, </a:t>
+            </a:r>
+            <a:r>
+              <a:rPr lang="en-US" sz="2000" dirty="0" smtClean="0">
+                <a:latin typeface="Times New Roman" pitchFamily="18" charset="0"/>
+                <a:cs typeface="Times New Roman" pitchFamily="18" charset="0"/>
+              </a:rPr>
+              <a:t>Co-</a:t>
             </a:r>
             <a:r>
               <a:rPr lang="en-US" sz="2000" dirty="0" err="1" smtClean="0">
                 <a:latin typeface="Times New Roman" pitchFamily="18" charset="0"/>
                 <a:cs typeface="Times New Roman" pitchFamily="18" charset="0"/>
               </a:rPr>
-              <a:t>subpoint</a:t>
+              <a:t>occurance</a:t>
             </a:r>
             <a:r>
               <a:rPr lang="en-US" sz="2000" dirty="0" smtClean="0">
                 <a:latin typeface="Times New Roman" pitchFamily="18" charset="0"/>
                 <a:cs typeface="Times New Roman" pitchFamily="18" charset="0"/>
               </a:rPr>
-              <a:t>.</a:t>
-            </a:r>
-            <a:endParaRPr lang="en-US" sz="2000" dirty="0">
+              <a:t> </a:t>
+            </a:r>
+            <a:r>
+              <a:rPr lang="en-US" sz="2000" dirty="0" smtClean="0">
+                <a:latin typeface="Times New Roman" pitchFamily="18" charset="0"/>
+                <a:cs typeface="Times New Roman" pitchFamily="18" charset="0"/>
+              </a:rPr>
+              <a:t>of lemmas).</a:t>
+            </a:r>
+          </a:p>
+          <a:p>
+            <a:pPr lvl="1"/>
+            <a:r>
+              <a:rPr lang="en-US" sz="2000" dirty="0" smtClean="0">
+                <a:latin typeface="Times New Roman" pitchFamily="18" charset="0"/>
+                <a:cs typeface="Times New Roman" pitchFamily="18" charset="0"/>
+              </a:rPr>
+              <a:t>When classifying pick the sentence-question pair that is most likely (but not necessarily classified) to be the answer.</a:t>
+            </a:r>
+          </a:p>
+          <a:p>
+            <a:pPr lvl="1"/>
+            <a:r>
+              <a:rPr lang="en-US" sz="2000" dirty="0" smtClean="0">
+                <a:latin typeface="Times New Roman" pitchFamily="18" charset="0"/>
+                <a:cs typeface="Times New Roman" pitchFamily="18" charset="0"/>
+              </a:rPr>
+              <a:t>These features were taken from Ng et al. [4] with one set of Question Type features added.</a:t>
+            </a:r>
+            <a:endParaRPr lang="en-US" sz="2400" dirty="0" smtClean="0">
+              <a:latin typeface="Times New Roman" pitchFamily="18" charset="0"/>
+              <a:cs typeface="Times New Roman" pitchFamily="18" charset="0"/>
+            </a:endParaRPr>
+          </a:p>
+          <a:p>
+            <a:pPr lvl="1"/>
+            <a:endParaRPr lang="en-US" sz="2000" dirty="0" smtClean="0">
               <a:latin typeface="Times New Roman" pitchFamily="18" charset="0"/>
               <a:cs typeface="Times New Roman" pitchFamily="18" charset="0"/>
             </a:endParaRPr>
@@ -3643,6 +3718,2396 @@
     <p:extLst>
       <p:ext uri="{BB962C8B-B14F-4D97-AF65-F5344CB8AC3E}">
         <p14:creationId xmlns:p14="http://schemas.microsoft.com/office/powerpoint/2010/main" val="1411260889"/>
+      </p:ext>
+    </p:extLst>
+  </p:cSld>
+  <p:clrMapOvr>
+    <a:masterClrMapping/>
+  </p:clrMapOvr>
+  <p:timing>
+    <p:tnLst>
+      <p:par>
+        <p:cTn id="1" dur="indefinite" restart="never" nodeType="tmRoot"/>
+      </p:par>
+    </p:tnLst>
+  </p:timing>
+</p:sld>
+</file>
+
+<file path=ppt/slides/slide3.xml><?xml version="1.0" encoding="utf-8"?>
+<p:sld xmlns:a="http://schemas.openxmlformats.org/drawingml/2006/main" xmlns:r="http://schemas.openxmlformats.org/officeDocument/2006/relationships" xmlns:p="http://schemas.openxmlformats.org/presentationml/2006/main">
+  <p:cSld>
+    <p:spTree>
+      <p:nvGrpSpPr>
+        <p:cNvPr id="1" name=""/>
+        <p:cNvGrpSpPr/>
+        <p:nvPr/>
+      </p:nvGrpSpPr>
+      <p:grpSpPr>
+        <a:xfrm>
+          <a:off x="0" y="0"/>
+          <a:ext cx="0" cy="0"/>
+          <a:chOff x="0" y="0"/>
+          <a:chExt cx="0" cy="0"/>
+        </a:xfrm>
+      </p:grpSpPr>
+      <p:sp>
+        <p:nvSpPr>
+          <p:cNvPr id="2" name="Title 1"/>
+          <p:cNvSpPr>
+            <a:spLocks noGrp="1"/>
+          </p:cNvSpPr>
+          <p:nvPr>
+            <p:ph type="title"/>
+          </p:nvPr>
+        </p:nvSpPr>
+        <p:spPr>
+          <a:xfrm>
+            <a:off x="1219200" y="274638"/>
+            <a:ext cx="7467600" cy="715962"/>
+          </a:xfrm>
+        </p:spPr>
+        <p:txBody>
+          <a:bodyPr>
+            <a:normAutofit/>
+          </a:bodyPr>
+          <a:lstStyle/>
+          <a:p>
+            <a:r>
+              <a:rPr lang="en-US" sz="3200" dirty="0" smtClean="0">
+                <a:solidFill>
+                  <a:schemeClr val="tx2"/>
+                </a:solidFill>
+                <a:latin typeface="Times New Roman" pitchFamily="18" charset="0"/>
+                <a:cs typeface="Times New Roman" pitchFamily="18" charset="0"/>
+              </a:rPr>
+              <a:t>Support Vector Machine Component</a:t>
+            </a:r>
+            <a:endParaRPr lang="en-US" sz="3200" dirty="0">
+              <a:solidFill>
+                <a:schemeClr val="tx2"/>
+              </a:solidFill>
+              <a:latin typeface="Times New Roman" pitchFamily="18" charset="0"/>
+              <a:cs typeface="Times New Roman" pitchFamily="18" charset="0"/>
+            </a:endParaRPr>
+          </a:p>
+        </p:txBody>
+      </p:sp>
+      <p:sp>
+        <p:nvSpPr>
+          <p:cNvPr id="3" name="Content Placeholder 2"/>
+          <p:cNvSpPr>
+            <a:spLocks noGrp="1"/>
+          </p:cNvSpPr>
+          <p:nvPr>
+            <p:ph idx="1"/>
+          </p:nvPr>
+        </p:nvSpPr>
+        <p:spPr>
+          <a:xfrm>
+            <a:off x="1219200" y="1219200"/>
+            <a:ext cx="7467600" cy="4748785"/>
+          </a:xfrm>
+        </p:spPr>
+        <p:txBody>
+          <a:bodyPr>
+            <a:normAutofit fontScale="92500"/>
+          </a:bodyPr>
+          <a:lstStyle/>
+          <a:p>
+            <a:r>
+              <a:rPr lang="en-US" sz="2400" dirty="0" smtClean="0">
+                <a:latin typeface="Times New Roman" pitchFamily="18" charset="0"/>
+                <a:cs typeface="Times New Roman" pitchFamily="18" charset="0"/>
+              </a:rPr>
+              <a:t>The main difference from [4] is that they used a C5 classifier. We substituted this for a Support Vector Machine (SVM).</a:t>
+            </a:r>
+          </a:p>
+          <a:p>
+            <a:pPr lvl="1"/>
+            <a:r>
+              <a:rPr lang="en-US" sz="2000" dirty="0" smtClean="0">
+                <a:latin typeface="Times New Roman" pitchFamily="18" charset="0"/>
+                <a:cs typeface="Times New Roman" pitchFamily="18" charset="0"/>
+              </a:rPr>
+              <a:t>In short, this model attempts to create a decision boundary between classes that maximizes the margin between the boundary and either class, penalizing instances that cross it.</a:t>
+            </a:r>
+          </a:p>
+          <a:p>
+            <a:pPr lvl="1"/>
+            <a:r>
+              <a:rPr lang="en-US" sz="2000" dirty="0" smtClean="0">
+                <a:latin typeface="Times New Roman" pitchFamily="18" charset="0"/>
+                <a:cs typeface="Times New Roman" pitchFamily="18" charset="0"/>
+              </a:rPr>
+              <a:t>Very popular right now.</a:t>
+            </a:r>
+          </a:p>
+          <a:p>
+            <a:r>
+              <a:rPr lang="en-US" sz="2400" dirty="0" smtClean="0">
+                <a:latin typeface="Times New Roman" pitchFamily="18" charset="0"/>
+                <a:cs typeface="Times New Roman" pitchFamily="18" charset="0"/>
+              </a:rPr>
+              <a:t>On the training set (“input-test1”), using the same features and training set (“input”) the SVM model classified sentences with </a:t>
+            </a:r>
+            <a:r>
+              <a:rPr lang="en-US" sz="2400" dirty="0">
+                <a:latin typeface="Times New Roman" pitchFamily="18" charset="0"/>
+                <a:cs typeface="Times New Roman" pitchFamily="18" charset="0"/>
+              </a:rPr>
+              <a:t>higher </a:t>
+            </a:r>
+            <a:r>
+              <a:rPr lang="en-US" sz="2400" dirty="0" smtClean="0">
+                <a:latin typeface="Times New Roman" pitchFamily="18" charset="0"/>
+                <a:cs typeface="Times New Roman" pitchFamily="18" charset="0"/>
+              </a:rPr>
+              <a:t>accuracy.</a:t>
+            </a:r>
+          </a:p>
+          <a:p>
+            <a:pPr lvl="1"/>
+            <a:r>
+              <a:rPr lang="en-US" sz="2000" dirty="0" smtClean="0">
+                <a:latin typeface="Times New Roman" pitchFamily="18" charset="0"/>
+                <a:cs typeface="Times New Roman" pitchFamily="18" charset="0"/>
+              </a:rPr>
+              <a:t>SVM </a:t>
+            </a:r>
+            <a:r>
+              <a:rPr lang="en-US" sz="2000" dirty="0">
+                <a:latin typeface="Times New Roman" pitchFamily="18" charset="0"/>
+                <a:cs typeface="Times New Roman" pitchFamily="18" charset="0"/>
+              </a:rPr>
+              <a:t>(148 out of 310</a:t>
+            </a:r>
+            <a:r>
+              <a:rPr lang="en-US" sz="2000" dirty="0" smtClean="0">
+                <a:latin typeface="Times New Roman" pitchFamily="18" charset="0"/>
+                <a:cs typeface="Times New Roman" pitchFamily="18" charset="0"/>
+              </a:rPr>
+              <a:t>) </a:t>
+            </a:r>
+          </a:p>
+          <a:p>
+            <a:pPr lvl="1"/>
+            <a:r>
+              <a:rPr lang="en-US" sz="2000" dirty="0" smtClean="0">
+                <a:latin typeface="Times New Roman" pitchFamily="18" charset="0"/>
+                <a:cs typeface="Times New Roman" pitchFamily="18" charset="0"/>
+              </a:rPr>
+              <a:t>C4.5 </a:t>
+            </a:r>
+            <a:r>
+              <a:rPr lang="en-US" sz="2000" dirty="0">
+                <a:latin typeface="Times New Roman" pitchFamily="18" charset="0"/>
+                <a:cs typeface="Times New Roman" pitchFamily="18" charset="0"/>
+              </a:rPr>
+              <a:t>implementation (131 out of 310</a:t>
+            </a:r>
+            <a:r>
+              <a:rPr lang="en-US" sz="2000" dirty="0" smtClean="0">
+                <a:latin typeface="Times New Roman" pitchFamily="18" charset="0"/>
+                <a:cs typeface="Times New Roman" pitchFamily="18" charset="0"/>
+              </a:rPr>
+              <a:t>).</a:t>
+            </a:r>
+          </a:p>
+          <a:p>
+            <a:r>
+              <a:rPr lang="en-US" sz="2400" dirty="0" smtClean="0">
+                <a:latin typeface="Times New Roman" pitchFamily="18" charset="0"/>
+                <a:cs typeface="Times New Roman" pitchFamily="18" charset="0"/>
+              </a:rPr>
+              <a:t>Software used:  WEKA [3], </a:t>
+            </a:r>
+            <a:r>
+              <a:rPr lang="en-US" sz="2400" dirty="0" err="1" smtClean="0">
+                <a:latin typeface="Times New Roman" pitchFamily="18" charset="0"/>
+                <a:cs typeface="Times New Roman" pitchFamily="18" charset="0"/>
+              </a:rPr>
+              <a:t>LibSVM</a:t>
+            </a:r>
+            <a:r>
+              <a:rPr lang="en-US" sz="2400" dirty="0" smtClean="0">
+                <a:latin typeface="Times New Roman" pitchFamily="18" charset="0"/>
+                <a:cs typeface="Times New Roman" pitchFamily="18" charset="0"/>
+              </a:rPr>
+              <a:t> [1], Stanford </a:t>
+            </a:r>
+            <a:r>
+              <a:rPr lang="en-US" sz="2400" dirty="0" err="1" smtClean="0">
+                <a:latin typeface="Times New Roman" pitchFamily="18" charset="0"/>
+                <a:cs typeface="Times New Roman" pitchFamily="18" charset="0"/>
+              </a:rPr>
+              <a:t>CoreNLP</a:t>
+            </a:r>
+            <a:r>
+              <a:rPr lang="en-US" sz="2400" dirty="0" smtClean="0">
+                <a:latin typeface="Times New Roman" pitchFamily="18" charset="0"/>
+                <a:cs typeface="Times New Roman" pitchFamily="18" charset="0"/>
+              </a:rPr>
+              <a:t> [2], [6]</a:t>
+            </a:r>
+          </a:p>
+          <a:p>
+            <a:pPr lvl="1"/>
+            <a:endParaRPr lang="en-US" sz="2000" dirty="0" smtClean="0">
+              <a:latin typeface="Times New Roman" pitchFamily="18" charset="0"/>
+              <a:cs typeface="Times New Roman" pitchFamily="18" charset="0"/>
+            </a:endParaRPr>
+          </a:p>
+        </p:txBody>
+      </p:sp>
+      <p:sp>
+        <p:nvSpPr>
+          <p:cNvPr id="4" name="Rectangle 3"/>
+          <p:cNvSpPr/>
+          <p:nvPr/>
+        </p:nvSpPr>
+        <p:spPr>
+          <a:xfrm rot="5400000">
+            <a:off x="-2417380" y="2793492"/>
+            <a:ext cx="5967984" cy="381000"/>
+          </a:xfrm>
+          <a:prstGeom prst="rect">
+            <a:avLst/>
+          </a:prstGeom>
+          <a:gradFill flip="none" rotWithShape="1">
+            <a:gsLst>
+              <a:gs pos="100000">
+                <a:srgbClr val="EEDC82"/>
+              </a:gs>
+              <a:gs pos="0">
+                <a:srgbClr val="D2DDF1"/>
+              </a:gs>
+              <a:gs pos="0">
+                <a:schemeClr val="tx2"/>
+              </a:gs>
+            </a:gsLst>
+            <a:lin ang="0" scaled="1"/>
+            <a:tileRect/>
+          </a:gradFill>
+          <a:ln>
+            <a:noFill/>
+          </a:ln>
+        </p:spPr>
+        <p:style>
+          <a:lnRef idx="2">
+            <a:schemeClr val="accent1">
+              <a:shade val="50000"/>
+            </a:schemeClr>
+          </a:lnRef>
+          <a:fillRef idx="1">
+            <a:schemeClr val="accent1"/>
+          </a:fillRef>
+          <a:effectRef idx="0">
+            <a:schemeClr val="accent1"/>
+          </a:effectRef>
+          <a:fontRef idx="minor">
+            <a:schemeClr val="lt1"/>
+          </a:fontRef>
+        </p:style>
+        <p:txBody>
+          <a:bodyPr rtlCol="0" anchor="ctr"/>
+          <a:lstStyle/>
+          <a:p>
+            <a:pPr algn="ctr"/>
+            <a:endParaRPr lang="en-US"/>
+          </a:p>
+        </p:txBody>
+      </p:sp>
+      <p:sp>
+        <p:nvSpPr>
+          <p:cNvPr id="5" name="Rectangle 4"/>
+          <p:cNvSpPr/>
+          <p:nvPr/>
+        </p:nvSpPr>
+        <p:spPr>
+          <a:xfrm rot="10800000">
+            <a:off x="961960" y="6096003"/>
+            <a:ext cx="8178992" cy="381000"/>
+          </a:xfrm>
+          <a:prstGeom prst="rect">
+            <a:avLst/>
+          </a:prstGeom>
+          <a:gradFill flip="none" rotWithShape="1">
+            <a:gsLst>
+              <a:gs pos="100000">
+                <a:srgbClr val="EEDC82"/>
+              </a:gs>
+              <a:gs pos="0">
+                <a:srgbClr val="D2DDF1"/>
+              </a:gs>
+              <a:gs pos="0">
+                <a:schemeClr val="tx2"/>
+              </a:gs>
+            </a:gsLst>
+            <a:lin ang="0" scaled="1"/>
+            <a:tileRect/>
+          </a:gradFill>
+          <a:ln>
+            <a:noFill/>
+          </a:ln>
+        </p:spPr>
+        <p:style>
+          <a:lnRef idx="2">
+            <a:schemeClr val="accent1">
+              <a:shade val="50000"/>
+            </a:schemeClr>
+          </a:lnRef>
+          <a:fillRef idx="1">
+            <a:schemeClr val="accent1"/>
+          </a:fillRef>
+          <a:effectRef idx="0">
+            <a:schemeClr val="accent1"/>
+          </a:effectRef>
+          <a:fontRef idx="minor">
+            <a:schemeClr val="lt1"/>
+          </a:fontRef>
+        </p:style>
+        <p:txBody>
+          <a:bodyPr rtlCol="0" anchor="ctr"/>
+          <a:lstStyle/>
+          <a:p>
+            <a:pPr algn="ctr"/>
+            <a:endParaRPr lang="en-US"/>
+          </a:p>
+        </p:txBody>
+      </p:sp>
+      <p:pic>
+        <p:nvPicPr>
+          <p:cNvPr id="6" name="Picture 5"/>
+          <p:cNvPicPr>
+            <a:picLocks noChangeAspect="1"/>
+          </p:cNvPicPr>
+          <p:nvPr/>
+        </p:nvPicPr>
+        <p:blipFill>
+          <a:blip r:embed="rId2">
+            <a:extLst>
+              <a:ext uri="{28A0092B-C50C-407E-A947-70E740481C1C}">
+                <a14:useLocalDpi xmlns:a14="http://schemas.microsoft.com/office/drawing/2010/main" val="0"/>
+              </a:ext>
+            </a:extLst>
+          </a:blip>
+          <a:stretch>
+            <a:fillRect/>
+          </a:stretch>
+        </p:blipFill>
+        <p:spPr>
+          <a:xfrm>
+            <a:off x="73152" y="5791200"/>
+            <a:ext cx="995759" cy="990600"/>
+          </a:xfrm>
+          <a:prstGeom prst="rect">
+            <a:avLst/>
+          </a:prstGeom>
+        </p:spPr>
+      </p:pic>
+    </p:spTree>
+    <p:extLst>
+      <p:ext uri="{BB962C8B-B14F-4D97-AF65-F5344CB8AC3E}">
+        <p14:creationId xmlns:p14="http://schemas.microsoft.com/office/powerpoint/2010/main" val="1986848281"/>
+      </p:ext>
+    </p:extLst>
+  </p:cSld>
+  <p:clrMapOvr>
+    <a:masterClrMapping/>
+  </p:clrMapOvr>
+  <p:timing>
+    <p:tnLst>
+      <p:par>
+        <p:cTn id="1" dur="indefinite" restart="never" nodeType="tmRoot"/>
+      </p:par>
+    </p:tnLst>
+  </p:timing>
+</p:sld>
+</file>
+
+<file path=ppt/slides/slide4.xml><?xml version="1.0" encoding="utf-8"?>
+<p:sld xmlns:a="http://schemas.openxmlformats.org/drawingml/2006/main" xmlns:r="http://schemas.openxmlformats.org/officeDocument/2006/relationships" xmlns:p="http://schemas.openxmlformats.org/presentationml/2006/main">
+  <p:cSld>
+    <p:spTree>
+      <p:nvGrpSpPr>
+        <p:cNvPr id="1" name=""/>
+        <p:cNvGrpSpPr/>
+        <p:nvPr/>
+      </p:nvGrpSpPr>
+      <p:grpSpPr>
+        <a:xfrm>
+          <a:off x="0" y="0"/>
+          <a:ext cx="0" cy="0"/>
+          <a:chOff x="0" y="0"/>
+          <a:chExt cx="0" cy="0"/>
+        </a:xfrm>
+      </p:grpSpPr>
+      <p:sp>
+        <p:nvSpPr>
+          <p:cNvPr id="2" name="Title 1"/>
+          <p:cNvSpPr>
+            <a:spLocks noGrp="1"/>
+          </p:cNvSpPr>
+          <p:nvPr>
+            <p:ph type="title"/>
+          </p:nvPr>
+        </p:nvSpPr>
+        <p:spPr>
+          <a:xfrm>
+            <a:off x="1219200" y="274638"/>
+            <a:ext cx="7467600" cy="715962"/>
+          </a:xfrm>
+        </p:spPr>
+        <p:txBody>
+          <a:bodyPr>
+            <a:normAutofit/>
+          </a:bodyPr>
+          <a:lstStyle/>
+          <a:p>
+            <a:r>
+              <a:rPr lang="en-US" sz="3200" dirty="0" smtClean="0">
+                <a:solidFill>
+                  <a:schemeClr val="tx2"/>
+                </a:solidFill>
+                <a:latin typeface="Times New Roman" pitchFamily="18" charset="0"/>
+                <a:cs typeface="Times New Roman" pitchFamily="18" charset="0"/>
+              </a:rPr>
+              <a:t>System Model</a:t>
+            </a:r>
+            <a:endParaRPr lang="en-US" sz="3200" dirty="0">
+              <a:solidFill>
+                <a:schemeClr val="tx2"/>
+              </a:solidFill>
+              <a:latin typeface="Times New Roman" pitchFamily="18" charset="0"/>
+              <a:cs typeface="Times New Roman" pitchFamily="18" charset="0"/>
+            </a:endParaRPr>
+          </a:p>
+        </p:txBody>
+      </p:sp>
+      <p:sp>
+        <p:nvSpPr>
+          <p:cNvPr id="4" name="Rectangle 3"/>
+          <p:cNvSpPr/>
+          <p:nvPr/>
+        </p:nvSpPr>
+        <p:spPr>
+          <a:xfrm rot="5400000">
+            <a:off x="-2417380" y="2793492"/>
+            <a:ext cx="5967984" cy="381000"/>
+          </a:xfrm>
+          <a:prstGeom prst="rect">
+            <a:avLst/>
+          </a:prstGeom>
+          <a:gradFill flip="none" rotWithShape="1">
+            <a:gsLst>
+              <a:gs pos="100000">
+                <a:srgbClr val="EEDC82"/>
+              </a:gs>
+              <a:gs pos="0">
+                <a:srgbClr val="D2DDF1"/>
+              </a:gs>
+              <a:gs pos="0">
+                <a:schemeClr val="tx2"/>
+              </a:gs>
+            </a:gsLst>
+            <a:lin ang="0" scaled="1"/>
+            <a:tileRect/>
+          </a:gradFill>
+          <a:ln>
+            <a:noFill/>
+          </a:ln>
+        </p:spPr>
+        <p:style>
+          <a:lnRef idx="2">
+            <a:schemeClr val="accent1">
+              <a:shade val="50000"/>
+            </a:schemeClr>
+          </a:lnRef>
+          <a:fillRef idx="1">
+            <a:schemeClr val="accent1"/>
+          </a:fillRef>
+          <a:effectRef idx="0">
+            <a:schemeClr val="accent1"/>
+          </a:effectRef>
+          <a:fontRef idx="minor">
+            <a:schemeClr val="lt1"/>
+          </a:fontRef>
+        </p:style>
+        <p:txBody>
+          <a:bodyPr rtlCol="0" anchor="ctr"/>
+          <a:lstStyle/>
+          <a:p>
+            <a:pPr algn="ctr"/>
+            <a:endParaRPr lang="en-US"/>
+          </a:p>
+        </p:txBody>
+      </p:sp>
+      <p:sp>
+        <p:nvSpPr>
+          <p:cNvPr id="5" name="Rectangle 4"/>
+          <p:cNvSpPr/>
+          <p:nvPr/>
+        </p:nvSpPr>
+        <p:spPr>
+          <a:xfrm rot="10800000">
+            <a:off x="961960" y="6096003"/>
+            <a:ext cx="8178992" cy="381000"/>
+          </a:xfrm>
+          <a:prstGeom prst="rect">
+            <a:avLst/>
+          </a:prstGeom>
+          <a:gradFill flip="none" rotWithShape="1">
+            <a:gsLst>
+              <a:gs pos="100000">
+                <a:srgbClr val="EEDC82"/>
+              </a:gs>
+              <a:gs pos="0">
+                <a:srgbClr val="D2DDF1"/>
+              </a:gs>
+              <a:gs pos="0">
+                <a:schemeClr val="tx2"/>
+              </a:gs>
+            </a:gsLst>
+            <a:lin ang="0" scaled="1"/>
+            <a:tileRect/>
+          </a:gradFill>
+          <a:ln>
+            <a:noFill/>
+          </a:ln>
+        </p:spPr>
+        <p:style>
+          <a:lnRef idx="2">
+            <a:schemeClr val="accent1">
+              <a:shade val="50000"/>
+            </a:schemeClr>
+          </a:lnRef>
+          <a:fillRef idx="1">
+            <a:schemeClr val="accent1"/>
+          </a:fillRef>
+          <a:effectRef idx="0">
+            <a:schemeClr val="accent1"/>
+          </a:effectRef>
+          <a:fontRef idx="minor">
+            <a:schemeClr val="lt1"/>
+          </a:fontRef>
+        </p:style>
+        <p:txBody>
+          <a:bodyPr rtlCol="0" anchor="ctr"/>
+          <a:lstStyle/>
+          <a:p>
+            <a:pPr algn="ctr"/>
+            <a:endParaRPr lang="en-US"/>
+          </a:p>
+        </p:txBody>
+      </p:sp>
+      <p:pic>
+        <p:nvPicPr>
+          <p:cNvPr id="6" name="Picture 5"/>
+          <p:cNvPicPr>
+            <a:picLocks noChangeAspect="1"/>
+          </p:cNvPicPr>
+          <p:nvPr/>
+        </p:nvPicPr>
+        <p:blipFill>
+          <a:blip r:embed="rId2">
+            <a:extLst>
+              <a:ext uri="{28A0092B-C50C-407E-A947-70E740481C1C}">
+                <a14:useLocalDpi xmlns:a14="http://schemas.microsoft.com/office/drawing/2010/main" val="0"/>
+              </a:ext>
+            </a:extLst>
+          </a:blip>
+          <a:stretch>
+            <a:fillRect/>
+          </a:stretch>
+        </p:blipFill>
+        <p:spPr>
+          <a:xfrm>
+            <a:off x="73152" y="5791200"/>
+            <a:ext cx="995759" cy="990600"/>
+          </a:xfrm>
+          <a:prstGeom prst="rect">
+            <a:avLst/>
+          </a:prstGeom>
+        </p:spPr>
+      </p:pic>
+      <p:pic>
+        <p:nvPicPr>
+          <p:cNvPr id="7" name="Picture 6"/>
+          <p:cNvPicPr>
+            <a:picLocks noChangeAspect="1"/>
+          </p:cNvPicPr>
+          <p:nvPr/>
+        </p:nvPicPr>
+        <p:blipFill>
+          <a:blip r:embed="rId3">
+            <a:extLst>
+              <a:ext uri="{28A0092B-C50C-407E-A947-70E740481C1C}">
+                <a14:useLocalDpi xmlns:a14="http://schemas.microsoft.com/office/drawing/2010/main" val="0"/>
+              </a:ext>
+            </a:extLst>
+          </a:blip>
+          <a:stretch>
+            <a:fillRect/>
+          </a:stretch>
+        </p:blipFill>
+        <p:spPr>
+          <a:xfrm>
+            <a:off x="1371600" y="1447800"/>
+            <a:ext cx="7142858" cy="3819048"/>
+          </a:xfrm>
+          <a:prstGeom prst="rect">
+            <a:avLst/>
+          </a:prstGeom>
+        </p:spPr>
+      </p:pic>
+    </p:spTree>
+    <p:extLst>
+      <p:ext uri="{BB962C8B-B14F-4D97-AF65-F5344CB8AC3E}">
+        <p14:creationId xmlns:p14="http://schemas.microsoft.com/office/powerpoint/2010/main" val="3797520296"/>
+      </p:ext>
+    </p:extLst>
+  </p:cSld>
+  <p:clrMapOvr>
+    <a:masterClrMapping/>
+  </p:clrMapOvr>
+  <p:timing>
+    <p:tnLst>
+      <p:par>
+        <p:cTn id="1" dur="indefinite" restart="never" nodeType="tmRoot"/>
+      </p:par>
+    </p:tnLst>
+  </p:timing>
+</p:sld>
+</file>
+
+<file path=ppt/slides/slide5.xml><?xml version="1.0" encoding="utf-8"?>
+<p:sld xmlns:a="http://schemas.openxmlformats.org/drawingml/2006/main" xmlns:r="http://schemas.openxmlformats.org/officeDocument/2006/relationships" xmlns:p="http://schemas.openxmlformats.org/presentationml/2006/main">
+  <p:cSld>
+    <p:spTree>
+      <p:nvGrpSpPr>
+        <p:cNvPr id="1" name=""/>
+        <p:cNvGrpSpPr/>
+        <p:nvPr/>
+      </p:nvGrpSpPr>
+      <p:grpSpPr>
+        <a:xfrm>
+          <a:off x="0" y="0"/>
+          <a:ext cx="0" cy="0"/>
+          <a:chOff x="0" y="0"/>
+          <a:chExt cx="0" cy="0"/>
+        </a:xfrm>
+      </p:grpSpPr>
+      <p:sp>
+        <p:nvSpPr>
+          <p:cNvPr id="2" name="Title 1"/>
+          <p:cNvSpPr>
+            <a:spLocks noGrp="1"/>
+          </p:cNvSpPr>
+          <p:nvPr>
+            <p:ph type="title"/>
+          </p:nvPr>
+        </p:nvSpPr>
+        <p:spPr>
+          <a:xfrm>
+            <a:off x="1219200" y="274638"/>
+            <a:ext cx="7467600" cy="715962"/>
+          </a:xfrm>
+        </p:spPr>
+        <p:txBody>
+          <a:bodyPr>
+            <a:normAutofit/>
+          </a:bodyPr>
+          <a:lstStyle/>
+          <a:p>
+            <a:r>
+              <a:rPr lang="en-US" sz="3200" dirty="0" smtClean="0">
+                <a:solidFill>
+                  <a:schemeClr val="tx2"/>
+                </a:solidFill>
+                <a:latin typeface="Times New Roman" pitchFamily="18" charset="0"/>
+                <a:cs typeface="Times New Roman" pitchFamily="18" charset="0"/>
+              </a:rPr>
+              <a:t>Results</a:t>
+            </a:r>
+            <a:endParaRPr lang="en-US" sz="3200" dirty="0">
+              <a:solidFill>
+                <a:schemeClr val="tx2"/>
+              </a:solidFill>
+              <a:latin typeface="Times New Roman" pitchFamily="18" charset="0"/>
+              <a:cs typeface="Times New Roman" pitchFamily="18" charset="0"/>
+            </a:endParaRPr>
+          </a:p>
+        </p:txBody>
+      </p:sp>
+      <p:sp>
+        <p:nvSpPr>
+          <p:cNvPr id="4" name="Rectangle 3"/>
+          <p:cNvSpPr/>
+          <p:nvPr/>
+        </p:nvSpPr>
+        <p:spPr>
+          <a:xfrm rot="5400000">
+            <a:off x="-2417380" y="2793492"/>
+            <a:ext cx="5967984" cy="381000"/>
+          </a:xfrm>
+          <a:prstGeom prst="rect">
+            <a:avLst/>
+          </a:prstGeom>
+          <a:gradFill flip="none" rotWithShape="1">
+            <a:gsLst>
+              <a:gs pos="100000">
+                <a:srgbClr val="EEDC82"/>
+              </a:gs>
+              <a:gs pos="0">
+                <a:srgbClr val="D2DDF1"/>
+              </a:gs>
+              <a:gs pos="0">
+                <a:schemeClr val="tx2"/>
+              </a:gs>
+            </a:gsLst>
+            <a:lin ang="0" scaled="1"/>
+            <a:tileRect/>
+          </a:gradFill>
+          <a:ln>
+            <a:noFill/>
+          </a:ln>
+        </p:spPr>
+        <p:style>
+          <a:lnRef idx="2">
+            <a:schemeClr val="accent1">
+              <a:shade val="50000"/>
+            </a:schemeClr>
+          </a:lnRef>
+          <a:fillRef idx="1">
+            <a:schemeClr val="accent1"/>
+          </a:fillRef>
+          <a:effectRef idx="0">
+            <a:schemeClr val="accent1"/>
+          </a:effectRef>
+          <a:fontRef idx="minor">
+            <a:schemeClr val="lt1"/>
+          </a:fontRef>
+        </p:style>
+        <p:txBody>
+          <a:bodyPr rtlCol="0" anchor="ctr"/>
+          <a:lstStyle/>
+          <a:p>
+            <a:pPr algn="ctr"/>
+            <a:endParaRPr lang="en-US"/>
+          </a:p>
+        </p:txBody>
+      </p:sp>
+      <p:sp>
+        <p:nvSpPr>
+          <p:cNvPr id="5" name="Rectangle 4"/>
+          <p:cNvSpPr/>
+          <p:nvPr/>
+        </p:nvSpPr>
+        <p:spPr>
+          <a:xfrm rot="10800000">
+            <a:off x="961960" y="6096003"/>
+            <a:ext cx="8178992" cy="381000"/>
+          </a:xfrm>
+          <a:prstGeom prst="rect">
+            <a:avLst/>
+          </a:prstGeom>
+          <a:gradFill flip="none" rotWithShape="1">
+            <a:gsLst>
+              <a:gs pos="100000">
+                <a:srgbClr val="EEDC82"/>
+              </a:gs>
+              <a:gs pos="0">
+                <a:srgbClr val="D2DDF1"/>
+              </a:gs>
+              <a:gs pos="0">
+                <a:schemeClr val="tx2"/>
+              </a:gs>
+            </a:gsLst>
+            <a:lin ang="0" scaled="1"/>
+            <a:tileRect/>
+          </a:gradFill>
+          <a:ln>
+            <a:noFill/>
+          </a:ln>
+        </p:spPr>
+        <p:style>
+          <a:lnRef idx="2">
+            <a:schemeClr val="accent1">
+              <a:shade val="50000"/>
+            </a:schemeClr>
+          </a:lnRef>
+          <a:fillRef idx="1">
+            <a:schemeClr val="accent1"/>
+          </a:fillRef>
+          <a:effectRef idx="0">
+            <a:schemeClr val="accent1"/>
+          </a:effectRef>
+          <a:fontRef idx="minor">
+            <a:schemeClr val="lt1"/>
+          </a:fontRef>
+        </p:style>
+        <p:txBody>
+          <a:bodyPr rtlCol="0" anchor="ctr"/>
+          <a:lstStyle/>
+          <a:p>
+            <a:pPr algn="ctr"/>
+            <a:endParaRPr lang="en-US"/>
+          </a:p>
+        </p:txBody>
+      </p:sp>
+      <p:pic>
+        <p:nvPicPr>
+          <p:cNvPr id="6" name="Picture 5"/>
+          <p:cNvPicPr>
+            <a:picLocks noChangeAspect="1"/>
+          </p:cNvPicPr>
+          <p:nvPr/>
+        </p:nvPicPr>
+        <p:blipFill>
+          <a:blip r:embed="rId2">
+            <a:extLst>
+              <a:ext uri="{28A0092B-C50C-407E-A947-70E740481C1C}">
+                <a14:useLocalDpi xmlns:a14="http://schemas.microsoft.com/office/drawing/2010/main" val="0"/>
+              </a:ext>
+            </a:extLst>
+          </a:blip>
+          <a:stretch>
+            <a:fillRect/>
+          </a:stretch>
+        </p:blipFill>
+        <p:spPr>
+          <a:xfrm>
+            <a:off x="73152" y="5791200"/>
+            <a:ext cx="995759" cy="990600"/>
+          </a:xfrm>
+          <a:prstGeom prst="rect">
+            <a:avLst/>
+          </a:prstGeom>
+        </p:spPr>
+      </p:pic>
+      <p:pic>
+        <p:nvPicPr>
+          <p:cNvPr id="3" name="Picture 2"/>
+          <p:cNvPicPr>
+            <a:picLocks noChangeAspect="1"/>
+          </p:cNvPicPr>
+          <p:nvPr/>
+        </p:nvPicPr>
+        <p:blipFill>
+          <a:blip r:embed="rId3">
+            <a:extLst>
+              <a:ext uri="{28A0092B-C50C-407E-A947-70E740481C1C}">
+                <a14:useLocalDpi xmlns:a14="http://schemas.microsoft.com/office/drawing/2010/main" val="0"/>
+              </a:ext>
+            </a:extLst>
+          </a:blip>
+          <a:stretch>
+            <a:fillRect/>
+          </a:stretch>
+        </p:blipFill>
+        <p:spPr>
+          <a:xfrm>
+            <a:off x="958912" y="1828800"/>
+            <a:ext cx="3832544" cy="3153215"/>
+          </a:xfrm>
+          <a:prstGeom prst="rect">
+            <a:avLst/>
+          </a:prstGeom>
+        </p:spPr>
+      </p:pic>
+      <p:pic>
+        <p:nvPicPr>
+          <p:cNvPr id="8" name="Picture 7"/>
+          <p:cNvPicPr>
+            <a:picLocks noChangeAspect="1"/>
+          </p:cNvPicPr>
+          <p:nvPr/>
+        </p:nvPicPr>
+        <p:blipFill>
+          <a:blip r:embed="rId4">
+            <a:extLst>
+              <a:ext uri="{28A0092B-C50C-407E-A947-70E740481C1C}">
+                <a14:useLocalDpi xmlns:a14="http://schemas.microsoft.com/office/drawing/2010/main" val="0"/>
+              </a:ext>
+            </a:extLst>
+          </a:blip>
+          <a:stretch>
+            <a:fillRect/>
+          </a:stretch>
+        </p:blipFill>
+        <p:spPr>
+          <a:xfrm>
+            <a:off x="4791456" y="1828800"/>
+            <a:ext cx="3880104" cy="3086965"/>
+          </a:xfrm>
+          <a:prstGeom prst="rect">
+            <a:avLst/>
+          </a:prstGeom>
+        </p:spPr>
+      </p:pic>
+    </p:spTree>
+    <p:extLst>
+      <p:ext uri="{BB962C8B-B14F-4D97-AF65-F5344CB8AC3E}">
+        <p14:creationId xmlns:p14="http://schemas.microsoft.com/office/powerpoint/2010/main" val="3059610670"/>
+      </p:ext>
+    </p:extLst>
+  </p:cSld>
+  <p:clrMapOvr>
+    <a:masterClrMapping/>
+  </p:clrMapOvr>
+  <p:timing>
+    <p:tnLst>
+      <p:par>
+        <p:cTn id="1" dur="indefinite" restart="never" nodeType="tmRoot"/>
+      </p:par>
+    </p:tnLst>
+  </p:timing>
+</p:sld>
+</file>
+
+<file path=ppt/slides/slide6.xml><?xml version="1.0" encoding="utf-8"?>
+<p:sld xmlns:a="http://schemas.openxmlformats.org/drawingml/2006/main" xmlns:r="http://schemas.openxmlformats.org/officeDocument/2006/relationships" xmlns:p="http://schemas.openxmlformats.org/presentationml/2006/main">
+  <p:cSld>
+    <p:spTree>
+      <p:nvGrpSpPr>
+        <p:cNvPr id="1" name=""/>
+        <p:cNvGrpSpPr/>
+        <p:nvPr/>
+      </p:nvGrpSpPr>
+      <p:grpSpPr>
+        <a:xfrm>
+          <a:off x="0" y="0"/>
+          <a:ext cx="0" cy="0"/>
+          <a:chOff x="0" y="0"/>
+          <a:chExt cx="0" cy="0"/>
+        </a:xfrm>
+      </p:grpSpPr>
+      <p:sp>
+        <p:nvSpPr>
+          <p:cNvPr id="2" name="Title 1"/>
+          <p:cNvSpPr>
+            <a:spLocks noGrp="1"/>
+          </p:cNvSpPr>
+          <p:nvPr>
+            <p:ph type="title"/>
+          </p:nvPr>
+        </p:nvSpPr>
+        <p:spPr>
+          <a:xfrm>
+            <a:off x="1219200" y="274638"/>
+            <a:ext cx="7467600" cy="715962"/>
+          </a:xfrm>
+        </p:spPr>
+        <p:txBody>
+          <a:bodyPr>
+            <a:normAutofit/>
+          </a:bodyPr>
+          <a:lstStyle/>
+          <a:p>
+            <a:r>
+              <a:rPr lang="en-US" sz="3200" dirty="0" smtClean="0">
+                <a:solidFill>
+                  <a:schemeClr val="tx2"/>
+                </a:solidFill>
+                <a:latin typeface="Times New Roman" pitchFamily="18" charset="0"/>
+                <a:cs typeface="Times New Roman" pitchFamily="18" charset="0"/>
+              </a:rPr>
+              <a:t>Conclusions</a:t>
+            </a:r>
+            <a:endParaRPr lang="en-US" sz="3200" dirty="0">
+              <a:solidFill>
+                <a:schemeClr val="tx2"/>
+              </a:solidFill>
+              <a:latin typeface="Times New Roman" pitchFamily="18" charset="0"/>
+              <a:cs typeface="Times New Roman" pitchFamily="18" charset="0"/>
+            </a:endParaRPr>
+          </a:p>
+        </p:txBody>
+      </p:sp>
+      <p:sp>
+        <p:nvSpPr>
+          <p:cNvPr id="3" name="Content Placeholder 2"/>
+          <p:cNvSpPr>
+            <a:spLocks noGrp="1"/>
+          </p:cNvSpPr>
+          <p:nvPr>
+            <p:ph idx="1"/>
+          </p:nvPr>
+        </p:nvSpPr>
+        <p:spPr>
+          <a:xfrm>
+            <a:off x="1219200" y="1219200"/>
+            <a:ext cx="7467600" cy="4748785"/>
+          </a:xfrm>
+        </p:spPr>
+        <p:txBody>
+          <a:bodyPr>
+            <a:normAutofit/>
+          </a:bodyPr>
+          <a:lstStyle/>
+          <a:p>
+            <a:r>
+              <a:rPr lang="en-US" sz="2400" dirty="0" smtClean="0">
+                <a:latin typeface="Times New Roman" pitchFamily="18" charset="0"/>
+                <a:cs typeface="Times New Roman" pitchFamily="18" charset="0"/>
+              </a:rPr>
+              <a:t>Components:</a:t>
+            </a:r>
+          </a:p>
+          <a:p>
+            <a:pPr lvl="1"/>
+            <a:r>
+              <a:rPr lang="en-US" sz="1600" dirty="0" smtClean="0">
+                <a:latin typeface="Times New Roman" pitchFamily="18" charset="0"/>
+                <a:cs typeface="Times New Roman" pitchFamily="18" charset="0"/>
+              </a:rPr>
+              <a:t>Simple Bag of Words</a:t>
+            </a:r>
+          </a:p>
+          <a:p>
+            <a:pPr lvl="1"/>
+            <a:r>
+              <a:rPr lang="en-US" sz="1600" dirty="0" smtClean="0">
+                <a:latin typeface="Times New Roman" pitchFamily="18" charset="0"/>
+                <a:cs typeface="Times New Roman" pitchFamily="18" charset="0"/>
+              </a:rPr>
+              <a:t>Linguistic, Rule-bed Strategy</a:t>
+            </a:r>
+          </a:p>
+          <a:p>
+            <a:pPr lvl="1"/>
+            <a:r>
+              <a:rPr lang="en-US" sz="1600" dirty="0" smtClean="0">
+                <a:latin typeface="Times New Roman" pitchFamily="18" charset="0"/>
+                <a:cs typeface="Times New Roman" pitchFamily="18" charset="0"/>
+              </a:rPr>
+              <a:t>ALEX PUT YOUR COMPONENTS HERE</a:t>
+            </a:r>
+          </a:p>
+          <a:p>
+            <a:pPr lvl="1"/>
+            <a:r>
+              <a:rPr lang="en-US" sz="1600" dirty="0" smtClean="0">
+                <a:latin typeface="Times New Roman" pitchFamily="18" charset="0"/>
+                <a:cs typeface="Times New Roman" pitchFamily="18" charset="0"/>
+              </a:rPr>
+              <a:t>Support Vector Machine</a:t>
+            </a:r>
+            <a:endParaRPr lang="en-US" sz="1600" dirty="0" smtClean="0">
+              <a:latin typeface="Times New Roman" pitchFamily="18" charset="0"/>
+              <a:cs typeface="Times New Roman" pitchFamily="18" charset="0"/>
+            </a:endParaRPr>
+          </a:p>
+          <a:p>
+            <a:r>
+              <a:rPr lang="en-US" sz="2400" dirty="0" smtClean="0">
+                <a:latin typeface="Times New Roman" pitchFamily="18" charset="0"/>
+                <a:cs typeface="Times New Roman" pitchFamily="18" charset="0"/>
+              </a:rPr>
+              <a:t>Each component answers fairly accurately for certain kinds of questions but not for others.</a:t>
+            </a:r>
+          </a:p>
+          <a:p>
+            <a:pPr lvl="1"/>
+            <a:r>
+              <a:rPr lang="en-US" sz="2000" dirty="0" smtClean="0">
+                <a:latin typeface="Times New Roman" pitchFamily="18" charset="0"/>
+                <a:cs typeface="Times New Roman" pitchFamily="18" charset="0"/>
+              </a:rPr>
+              <a:t>By combining the components intelligently, we can improve overall accuracy.</a:t>
+            </a:r>
+          </a:p>
+          <a:p>
+            <a:r>
+              <a:rPr lang="en-US" sz="2400" dirty="0" smtClean="0">
+                <a:latin typeface="Times New Roman" pitchFamily="18" charset="0"/>
+                <a:cs typeface="Times New Roman" pitchFamily="18" charset="0"/>
+              </a:rPr>
+              <a:t>Possible Improvements:</a:t>
+            </a:r>
+          </a:p>
+          <a:p>
+            <a:pPr lvl="1"/>
+            <a:r>
+              <a:rPr lang="en-US" sz="2000" dirty="0" smtClean="0">
+                <a:latin typeface="Times New Roman" pitchFamily="18" charset="0"/>
+                <a:cs typeface="Times New Roman" pitchFamily="18" charset="0"/>
+              </a:rPr>
+              <a:t>Anaphora resolution for SVM.</a:t>
+            </a:r>
+          </a:p>
+          <a:p>
+            <a:pPr lvl="1"/>
+            <a:r>
+              <a:rPr lang="en-US" sz="2000" dirty="0" smtClean="0">
+                <a:latin typeface="Times New Roman" pitchFamily="18" charset="0"/>
+                <a:cs typeface="Times New Roman" pitchFamily="18" charset="0"/>
+              </a:rPr>
+              <a:t>More investigation of how to weight components.</a:t>
+            </a:r>
+          </a:p>
+          <a:p>
+            <a:pPr lvl="1"/>
+            <a:r>
+              <a:rPr lang="en-US" sz="2000" dirty="0" smtClean="0">
+                <a:latin typeface="Times New Roman" pitchFamily="18" charset="0"/>
+                <a:cs typeface="Times New Roman" pitchFamily="18" charset="0"/>
+              </a:rPr>
+              <a:t>Can easily add other components.</a:t>
+            </a:r>
+          </a:p>
+          <a:p>
+            <a:endParaRPr lang="en-US" sz="2400" dirty="0" smtClean="0">
+              <a:latin typeface="Times New Roman" pitchFamily="18" charset="0"/>
+              <a:cs typeface="Times New Roman" pitchFamily="18" charset="0"/>
+            </a:endParaRPr>
+          </a:p>
+        </p:txBody>
+      </p:sp>
+      <p:sp>
+        <p:nvSpPr>
+          <p:cNvPr id="4" name="Rectangle 3"/>
+          <p:cNvSpPr/>
+          <p:nvPr/>
+        </p:nvSpPr>
+        <p:spPr>
+          <a:xfrm rot="5400000">
+            <a:off x="-2417380" y="2793492"/>
+            <a:ext cx="5967984" cy="381000"/>
+          </a:xfrm>
+          <a:prstGeom prst="rect">
+            <a:avLst/>
+          </a:prstGeom>
+          <a:gradFill flip="none" rotWithShape="1">
+            <a:gsLst>
+              <a:gs pos="100000">
+                <a:srgbClr val="EEDC82"/>
+              </a:gs>
+              <a:gs pos="0">
+                <a:srgbClr val="D2DDF1"/>
+              </a:gs>
+              <a:gs pos="0">
+                <a:schemeClr val="tx2"/>
+              </a:gs>
+            </a:gsLst>
+            <a:lin ang="0" scaled="1"/>
+            <a:tileRect/>
+          </a:gradFill>
+          <a:ln>
+            <a:noFill/>
+          </a:ln>
+        </p:spPr>
+        <p:style>
+          <a:lnRef idx="2">
+            <a:schemeClr val="accent1">
+              <a:shade val="50000"/>
+            </a:schemeClr>
+          </a:lnRef>
+          <a:fillRef idx="1">
+            <a:schemeClr val="accent1"/>
+          </a:fillRef>
+          <a:effectRef idx="0">
+            <a:schemeClr val="accent1"/>
+          </a:effectRef>
+          <a:fontRef idx="minor">
+            <a:schemeClr val="lt1"/>
+          </a:fontRef>
+        </p:style>
+        <p:txBody>
+          <a:bodyPr rtlCol="0" anchor="ctr"/>
+          <a:lstStyle/>
+          <a:p>
+            <a:pPr algn="ctr"/>
+            <a:endParaRPr lang="en-US"/>
+          </a:p>
+        </p:txBody>
+      </p:sp>
+      <p:sp>
+        <p:nvSpPr>
+          <p:cNvPr id="5" name="Rectangle 4"/>
+          <p:cNvSpPr/>
+          <p:nvPr/>
+        </p:nvSpPr>
+        <p:spPr>
+          <a:xfrm rot="10800000">
+            <a:off x="961960" y="6096003"/>
+            <a:ext cx="8178992" cy="381000"/>
+          </a:xfrm>
+          <a:prstGeom prst="rect">
+            <a:avLst/>
+          </a:prstGeom>
+          <a:gradFill flip="none" rotWithShape="1">
+            <a:gsLst>
+              <a:gs pos="100000">
+                <a:srgbClr val="EEDC82"/>
+              </a:gs>
+              <a:gs pos="0">
+                <a:srgbClr val="D2DDF1"/>
+              </a:gs>
+              <a:gs pos="0">
+                <a:schemeClr val="tx2"/>
+              </a:gs>
+            </a:gsLst>
+            <a:lin ang="0" scaled="1"/>
+            <a:tileRect/>
+          </a:gradFill>
+          <a:ln>
+            <a:noFill/>
+          </a:ln>
+        </p:spPr>
+        <p:style>
+          <a:lnRef idx="2">
+            <a:schemeClr val="accent1">
+              <a:shade val="50000"/>
+            </a:schemeClr>
+          </a:lnRef>
+          <a:fillRef idx="1">
+            <a:schemeClr val="accent1"/>
+          </a:fillRef>
+          <a:effectRef idx="0">
+            <a:schemeClr val="accent1"/>
+          </a:effectRef>
+          <a:fontRef idx="minor">
+            <a:schemeClr val="lt1"/>
+          </a:fontRef>
+        </p:style>
+        <p:txBody>
+          <a:bodyPr rtlCol="0" anchor="ctr"/>
+          <a:lstStyle/>
+          <a:p>
+            <a:pPr algn="ctr"/>
+            <a:endParaRPr lang="en-US"/>
+          </a:p>
+        </p:txBody>
+      </p:sp>
+      <p:pic>
+        <p:nvPicPr>
+          <p:cNvPr id="6" name="Picture 5"/>
+          <p:cNvPicPr>
+            <a:picLocks noChangeAspect="1"/>
+          </p:cNvPicPr>
+          <p:nvPr/>
+        </p:nvPicPr>
+        <p:blipFill>
+          <a:blip r:embed="rId2">
+            <a:extLst>
+              <a:ext uri="{28A0092B-C50C-407E-A947-70E740481C1C}">
+                <a14:useLocalDpi xmlns:a14="http://schemas.microsoft.com/office/drawing/2010/main" val="0"/>
+              </a:ext>
+            </a:extLst>
+          </a:blip>
+          <a:stretch>
+            <a:fillRect/>
+          </a:stretch>
+        </p:blipFill>
+        <p:spPr>
+          <a:xfrm>
+            <a:off x="73152" y="5791200"/>
+            <a:ext cx="995759" cy="990600"/>
+          </a:xfrm>
+          <a:prstGeom prst="rect">
+            <a:avLst/>
+          </a:prstGeom>
+        </p:spPr>
+      </p:pic>
+    </p:spTree>
+    <p:extLst>
+      <p:ext uri="{BB962C8B-B14F-4D97-AF65-F5344CB8AC3E}">
+        <p14:creationId xmlns:p14="http://schemas.microsoft.com/office/powerpoint/2010/main" val="986917914"/>
+      </p:ext>
+    </p:extLst>
+  </p:cSld>
+  <p:clrMapOvr>
+    <a:masterClrMapping/>
+  </p:clrMapOvr>
+  <p:timing>
+    <p:tnLst>
+      <p:par>
+        <p:cTn id="1" dur="indefinite" restart="never" nodeType="tmRoot"/>
+      </p:par>
+    </p:tnLst>
+  </p:timing>
+</p:sld>
+</file>
+
+<file path=ppt/slides/slide7.xml><?xml version="1.0" encoding="utf-8"?>
+<p:sld xmlns:a="http://schemas.openxmlformats.org/drawingml/2006/main" xmlns:r="http://schemas.openxmlformats.org/officeDocument/2006/relationships" xmlns:p="http://schemas.openxmlformats.org/presentationml/2006/main">
+  <p:cSld>
+    <p:spTree>
+      <p:nvGrpSpPr>
+        <p:cNvPr id="1" name=""/>
+        <p:cNvGrpSpPr/>
+        <p:nvPr/>
+      </p:nvGrpSpPr>
+      <p:grpSpPr>
+        <a:xfrm>
+          <a:off x="0" y="0"/>
+          <a:ext cx="0" cy="0"/>
+          <a:chOff x="0" y="0"/>
+          <a:chExt cx="0" cy="0"/>
+        </a:xfrm>
+      </p:grpSpPr>
+      <p:sp>
+        <p:nvSpPr>
+          <p:cNvPr id="2" name="Title 1"/>
+          <p:cNvSpPr>
+            <a:spLocks noGrp="1"/>
+          </p:cNvSpPr>
+          <p:nvPr>
+            <p:ph type="title"/>
+          </p:nvPr>
+        </p:nvSpPr>
+        <p:spPr>
+          <a:xfrm>
+            <a:off x="1219200" y="274638"/>
+            <a:ext cx="7467600" cy="715962"/>
+          </a:xfrm>
+        </p:spPr>
+        <p:txBody>
+          <a:bodyPr>
+            <a:normAutofit/>
+          </a:bodyPr>
+          <a:lstStyle/>
+          <a:p>
+            <a:r>
+              <a:rPr lang="en-US" sz="3200" dirty="0" smtClean="0">
+                <a:solidFill>
+                  <a:schemeClr val="tx2"/>
+                </a:solidFill>
+                <a:latin typeface="Times New Roman" pitchFamily="18" charset="0"/>
+                <a:cs typeface="Times New Roman" pitchFamily="18" charset="0"/>
+              </a:rPr>
+              <a:t>References</a:t>
+            </a:r>
+            <a:endParaRPr lang="en-US" sz="3200" dirty="0">
+              <a:solidFill>
+                <a:schemeClr val="tx2"/>
+              </a:solidFill>
+              <a:latin typeface="Times New Roman" pitchFamily="18" charset="0"/>
+              <a:cs typeface="Times New Roman" pitchFamily="18" charset="0"/>
+            </a:endParaRPr>
+          </a:p>
+        </p:txBody>
+      </p:sp>
+      <p:sp>
+        <p:nvSpPr>
+          <p:cNvPr id="3" name="Content Placeholder 2"/>
+          <p:cNvSpPr>
+            <a:spLocks noGrp="1"/>
+          </p:cNvSpPr>
+          <p:nvPr>
+            <p:ph idx="1"/>
+          </p:nvPr>
+        </p:nvSpPr>
+        <p:spPr>
+          <a:xfrm>
+            <a:off x="1219200" y="1219201"/>
+            <a:ext cx="7467600" cy="4748784"/>
+          </a:xfrm>
+        </p:spPr>
+        <p:txBody>
+          <a:bodyPr>
+            <a:normAutofit fontScale="70000" lnSpcReduction="20000"/>
+          </a:bodyPr>
+          <a:lstStyle/>
+          <a:p>
+            <a:pPr marL="0" indent="0">
+              <a:buNone/>
+            </a:pPr>
+            <a:r>
+              <a:rPr lang="en-US" sz="2000" dirty="0">
+                <a:latin typeface="Times New Roman" pitchFamily="18" charset="0"/>
+                <a:cs typeface="Times New Roman" pitchFamily="18" charset="0"/>
+              </a:rPr>
+              <a:t>[1] </a:t>
+            </a:r>
+            <a:r>
+              <a:rPr lang="en-US" sz="2000" dirty="0" err="1">
+                <a:latin typeface="Times New Roman" pitchFamily="18" charset="0"/>
+                <a:cs typeface="Times New Roman" pitchFamily="18" charset="0"/>
+              </a:rPr>
+              <a:t>Chih</a:t>
+            </a:r>
+            <a:r>
+              <a:rPr lang="en-US" sz="2000" dirty="0">
+                <a:latin typeface="Times New Roman" pitchFamily="18" charset="0"/>
+                <a:cs typeface="Times New Roman" pitchFamily="18" charset="0"/>
+              </a:rPr>
+              <a:t>-Chung Chang and </a:t>
+            </a:r>
+            <a:r>
+              <a:rPr lang="en-US" sz="2000" dirty="0" err="1">
+                <a:latin typeface="Times New Roman" pitchFamily="18" charset="0"/>
+                <a:cs typeface="Times New Roman" pitchFamily="18" charset="0"/>
+              </a:rPr>
+              <a:t>Chih</a:t>
+            </a:r>
+            <a:r>
+              <a:rPr lang="en-US" sz="2000" dirty="0">
+                <a:latin typeface="Times New Roman" pitchFamily="18" charset="0"/>
+                <a:cs typeface="Times New Roman" pitchFamily="18" charset="0"/>
+              </a:rPr>
+              <a:t>-Jen Lin. 2001. </a:t>
+            </a:r>
+            <a:r>
+              <a:rPr lang="en-US" sz="2000" dirty="0" err="1">
+                <a:latin typeface="Times New Roman" pitchFamily="18" charset="0"/>
+                <a:cs typeface="Times New Roman" pitchFamily="18" charset="0"/>
+              </a:rPr>
+              <a:t>Libsvm</a:t>
+            </a:r>
+            <a:r>
+              <a:rPr lang="en-US" sz="2000" dirty="0">
+                <a:latin typeface="Times New Roman" pitchFamily="18" charset="0"/>
+                <a:cs typeface="Times New Roman" pitchFamily="18" charset="0"/>
+              </a:rPr>
+              <a:t>: </a:t>
+            </a:r>
+            <a:r>
+              <a:rPr lang="en-US" sz="2000" dirty="0" smtClean="0">
+                <a:latin typeface="Times New Roman" pitchFamily="18" charset="0"/>
+                <a:cs typeface="Times New Roman" pitchFamily="18" charset="0"/>
+              </a:rPr>
+              <a:t>a library for support vector </a:t>
+            </a:r>
+            <a:r>
+              <a:rPr lang="en-US" sz="2000" dirty="0">
+                <a:latin typeface="Times New Roman" pitchFamily="18" charset="0"/>
+                <a:cs typeface="Times New Roman" pitchFamily="18" charset="0"/>
+              </a:rPr>
+              <a:t>machines</a:t>
+            </a:r>
+            <a:r>
+              <a:rPr lang="en-US" sz="2000" dirty="0" smtClean="0">
+                <a:latin typeface="Times New Roman" pitchFamily="18" charset="0"/>
+                <a:cs typeface="Times New Roman" pitchFamily="18" charset="0"/>
+              </a:rPr>
+              <a:t>.</a:t>
+            </a:r>
+          </a:p>
+          <a:p>
+            <a:pPr marL="0" indent="0">
+              <a:buNone/>
+            </a:pPr>
+            <a:r>
+              <a:rPr lang="en-US" sz="2000" dirty="0">
+                <a:latin typeface="Times New Roman" pitchFamily="18" charset="0"/>
+                <a:cs typeface="Times New Roman" pitchFamily="18" charset="0"/>
+              </a:rPr>
+              <a:t>[2] Jenny Rose </a:t>
+            </a:r>
+            <a:r>
+              <a:rPr lang="en-US" sz="2000" dirty="0" err="1">
+                <a:latin typeface="Times New Roman" pitchFamily="18" charset="0"/>
+                <a:cs typeface="Times New Roman" pitchFamily="18" charset="0"/>
+              </a:rPr>
+              <a:t>Finkel</a:t>
+            </a:r>
+            <a:r>
+              <a:rPr lang="en-US" sz="2000" dirty="0">
+                <a:latin typeface="Times New Roman" pitchFamily="18" charset="0"/>
+                <a:cs typeface="Times New Roman" pitchFamily="18" charset="0"/>
+              </a:rPr>
+              <a:t>, </a:t>
+            </a:r>
+            <a:r>
+              <a:rPr lang="en-US" sz="2000" dirty="0" err="1">
+                <a:latin typeface="Times New Roman" pitchFamily="18" charset="0"/>
+                <a:cs typeface="Times New Roman" pitchFamily="18" charset="0"/>
+              </a:rPr>
+              <a:t>Trond</a:t>
+            </a:r>
+            <a:r>
+              <a:rPr lang="en-US" sz="2000" dirty="0">
+                <a:latin typeface="Times New Roman" pitchFamily="18" charset="0"/>
+                <a:cs typeface="Times New Roman" pitchFamily="18" charset="0"/>
+              </a:rPr>
+              <a:t> </a:t>
+            </a:r>
+            <a:r>
+              <a:rPr lang="en-US" sz="2000" dirty="0" err="1">
+                <a:latin typeface="Times New Roman" pitchFamily="18" charset="0"/>
+                <a:cs typeface="Times New Roman" pitchFamily="18" charset="0"/>
+              </a:rPr>
+              <a:t>Grenager</a:t>
+            </a:r>
+            <a:r>
+              <a:rPr lang="en-US" sz="2000" dirty="0">
+                <a:latin typeface="Times New Roman" pitchFamily="18" charset="0"/>
+                <a:cs typeface="Times New Roman" pitchFamily="18" charset="0"/>
+              </a:rPr>
+              <a:t>, and </a:t>
+            </a:r>
+            <a:r>
+              <a:rPr lang="en-US" sz="2000" dirty="0" smtClean="0">
+                <a:latin typeface="Times New Roman" pitchFamily="18" charset="0"/>
+                <a:cs typeface="Times New Roman" pitchFamily="18" charset="0"/>
+              </a:rPr>
+              <a:t>Christopher Manning</a:t>
+            </a:r>
+            <a:r>
+              <a:rPr lang="en-US" sz="2000" dirty="0">
+                <a:latin typeface="Times New Roman" pitchFamily="18" charset="0"/>
+                <a:cs typeface="Times New Roman" pitchFamily="18" charset="0"/>
+              </a:rPr>
+              <a:t>. </a:t>
+            </a:r>
+            <a:r>
+              <a:rPr lang="en-US" sz="2000" dirty="0" smtClean="0">
+                <a:latin typeface="Times New Roman" pitchFamily="18" charset="0"/>
+                <a:cs typeface="Times New Roman" pitchFamily="18" charset="0"/>
+              </a:rPr>
+              <a:t>2005</a:t>
+            </a:r>
+            <a:r>
+              <a:rPr lang="en-US" sz="2000" dirty="0">
+                <a:latin typeface="Times New Roman" pitchFamily="18" charset="0"/>
+                <a:cs typeface="Times New Roman" pitchFamily="18" charset="0"/>
+              </a:rPr>
+              <a:t>. Incorporating non-local </a:t>
+            </a:r>
+            <a:r>
+              <a:rPr lang="en-US" sz="2000" dirty="0" smtClean="0">
+                <a:latin typeface="Times New Roman" pitchFamily="18" charset="0"/>
+                <a:cs typeface="Times New Roman" pitchFamily="18" charset="0"/>
+              </a:rPr>
+              <a:t>	information into information extraction </a:t>
+            </a:r>
+            <a:r>
+              <a:rPr lang="en-US" sz="2000" dirty="0">
+                <a:latin typeface="Times New Roman" pitchFamily="18" charset="0"/>
+                <a:cs typeface="Times New Roman" pitchFamily="18" charset="0"/>
+              </a:rPr>
+              <a:t>systems by </a:t>
+            </a:r>
+            <a:r>
+              <a:rPr lang="en-US" sz="2000" dirty="0" err="1">
+                <a:latin typeface="Times New Roman" pitchFamily="18" charset="0"/>
+                <a:cs typeface="Times New Roman" pitchFamily="18" charset="0"/>
+              </a:rPr>
+              <a:t>gibbs</a:t>
+            </a:r>
+            <a:r>
+              <a:rPr lang="en-US" sz="2000" dirty="0">
+                <a:latin typeface="Times New Roman" pitchFamily="18" charset="0"/>
+                <a:cs typeface="Times New Roman" pitchFamily="18" charset="0"/>
+              </a:rPr>
+              <a:t> </a:t>
+            </a:r>
+            <a:r>
+              <a:rPr lang="en-US" sz="2000" dirty="0" smtClean="0">
+                <a:latin typeface="Times New Roman" pitchFamily="18" charset="0"/>
+                <a:cs typeface="Times New Roman" pitchFamily="18" charset="0"/>
+              </a:rPr>
+              <a:t>sampling. In </a:t>
+            </a:r>
+            <a:r>
+              <a:rPr lang="en-US" sz="2000" dirty="0">
+                <a:latin typeface="Times New Roman" pitchFamily="18" charset="0"/>
+                <a:cs typeface="Times New Roman" pitchFamily="18" charset="0"/>
+              </a:rPr>
+              <a:t>ACL, pages </a:t>
+            </a:r>
+            <a:r>
+              <a:rPr lang="en-US" sz="2000" dirty="0" smtClean="0">
+                <a:latin typeface="Times New Roman" pitchFamily="18" charset="0"/>
+                <a:cs typeface="Times New Roman" pitchFamily="18" charset="0"/>
+              </a:rPr>
+              <a:t>363–	370.</a:t>
+            </a:r>
+          </a:p>
+          <a:p>
+            <a:pPr marL="0" indent="0">
+              <a:buNone/>
+            </a:pPr>
+            <a:r>
+              <a:rPr lang="en-US" sz="2000" dirty="0">
+                <a:latin typeface="Times New Roman" pitchFamily="18" charset="0"/>
+                <a:cs typeface="Times New Roman" pitchFamily="18" charset="0"/>
+              </a:rPr>
+              <a:t>[3] Mark Hall, </a:t>
+            </a:r>
+            <a:r>
+              <a:rPr lang="en-US" sz="2000" dirty="0" err="1">
+                <a:latin typeface="Times New Roman" pitchFamily="18" charset="0"/>
+                <a:cs typeface="Times New Roman" pitchFamily="18" charset="0"/>
+              </a:rPr>
+              <a:t>Eibe</a:t>
+            </a:r>
+            <a:r>
+              <a:rPr lang="en-US" sz="2000" dirty="0">
+                <a:latin typeface="Times New Roman" pitchFamily="18" charset="0"/>
+                <a:cs typeface="Times New Roman" pitchFamily="18" charset="0"/>
+              </a:rPr>
+              <a:t> Frank, Geoffrey Holmes, </a:t>
+            </a:r>
+            <a:r>
+              <a:rPr lang="en-US" sz="2000" dirty="0" smtClean="0">
+                <a:latin typeface="Times New Roman" pitchFamily="18" charset="0"/>
+                <a:cs typeface="Times New Roman" pitchFamily="18" charset="0"/>
+              </a:rPr>
+              <a:t>Bernhard </a:t>
+            </a:r>
+            <a:r>
+              <a:rPr lang="en-US" sz="2000" dirty="0" err="1" smtClean="0">
+                <a:latin typeface="Times New Roman" pitchFamily="18" charset="0"/>
+                <a:cs typeface="Times New Roman" pitchFamily="18" charset="0"/>
+              </a:rPr>
+              <a:t>Pfahringer</a:t>
+            </a:r>
+            <a:r>
+              <a:rPr lang="en-US" sz="2000" dirty="0" smtClean="0">
+                <a:latin typeface="Times New Roman" pitchFamily="18" charset="0"/>
+                <a:cs typeface="Times New Roman" pitchFamily="18" charset="0"/>
+              </a:rPr>
+              <a:t>, Peter </a:t>
+            </a:r>
+            <a:r>
+              <a:rPr lang="en-US" sz="2000" dirty="0" err="1" smtClean="0">
+                <a:latin typeface="Times New Roman" pitchFamily="18" charset="0"/>
+                <a:cs typeface="Times New Roman" pitchFamily="18" charset="0"/>
+              </a:rPr>
+              <a:t>Reutemann</a:t>
+            </a:r>
+            <a:r>
+              <a:rPr lang="en-US" sz="2000" dirty="0" smtClean="0">
+                <a:latin typeface="Times New Roman" pitchFamily="18" charset="0"/>
+                <a:cs typeface="Times New Roman" pitchFamily="18" charset="0"/>
+              </a:rPr>
+              <a:t>, and Ian H. 	Witten. The </a:t>
+            </a:r>
+            <a:r>
+              <a:rPr lang="en-US" sz="2000" dirty="0" err="1" smtClean="0">
+                <a:latin typeface="Times New Roman" pitchFamily="18" charset="0"/>
+                <a:cs typeface="Times New Roman" pitchFamily="18" charset="0"/>
+              </a:rPr>
+              <a:t>weka</a:t>
+            </a:r>
+            <a:r>
+              <a:rPr lang="en-US" sz="2000" dirty="0" smtClean="0">
+                <a:latin typeface="Times New Roman" pitchFamily="18" charset="0"/>
+                <a:cs typeface="Times New Roman" pitchFamily="18" charset="0"/>
+              </a:rPr>
+              <a:t> data mining software: An update.</a:t>
+            </a:r>
+          </a:p>
+          <a:p>
+            <a:pPr marL="0" indent="0">
+              <a:buNone/>
+            </a:pPr>
+            <a:r>
+              <a:rPr lang="en-US" sz="2000" dirty="0">
+                <a:latin typeface="Times New Roman" pitchFamily="18" charset="0"/>
+                <a:cs typeface="Times New Roman" pitchFamily="18" charset="0"/>
+              </a:rPr>
+              <a:t>[4] </a:t>
+            </a:r>
+            <a:r>
+              <a:rPr lang="en-US" sz="2000" dirty="0" err="1">
+                <a:latin typeface="Times New Roman" pitchFamily="18" charset="0"/>
+                <a:cs typeface="Times New Roman" pitchFamily="18" charset="0"/>
+              </a:rPr>
+              <a:t>Hwee</a:t>
+            </a:r>
+            <a:r>
+              <a:rPr lang="en-US" sz="2000" dirty="0">
+                <a:latin typeface="Times New Roman" pitchFamily="18" charset="0"/>
+                <a:cs typeface="Times New Roman" pitchFamily="18" charset="0"/>
+              </a:rPr>
+              <a:t> </a:t>
+            </a:r>
+            <a:r>
+              <a:rPr lang="en-US" sz="2000" dirty="0" err="1">
+                <a:latin typeface="Times New Roman" pitchFamily="18" charset="0"/>
+                <a:cs typeface="Times New Roman" pitchFamily="18" charset="0"/>
+              </a:rPr>
+              <a:t>Tou</a:t>
+            </a:r>
+            <a:r>
+              <a:rPr lang="en-US" sz="2000" dirty="0">
+                <a:latin typeface="Times New Roman" pitchFamily="18" charset="0"/>
+                <a:cs typeface="Times New Roman" pitchFamily="18" charset="0"/>
+              </a:rPr>
+              <a:t> Ng, Leong </a:t>
+            </a:r>
+            <a:r>
+              <a:rPr lang="en-US" sz="2000" dirty="0" err="1">
+                <a:latin typeface="Times New Roman" pitchFamily="18" charset="0"/>
+                <a:cs typeface="Times New Roman" pitchFamily="18" charset="0"/>
+              </a:rPr>
+              <a:t>Hwee</a:t>
+            </a:r>
+            <a:r>
+              <a:rPr lang="en-US" sz="2000" dirty="0">
+                <a:latin typeface="Times New Roman" pitchFamily="18" charset="0"/>
+                <a:cs typeface="Times New Roman" pitchFamily="18" charset="0"/>
+              </a:rPr>
+              <a:t> </a:t>
+            </a:r>
+            <a:r>
+              <a:rPr lang="en-US" sz="2000" dirty="0" err="1">
+                <a:latin typeface="Times New Roman" pitchFamily="18" charset="0"/>
+                <a:cs typeface="Times New Roman" pitchFamily="18" charset="0"/>
+              </a:rPr>
+              <a:t>Teo</a:t>
+            </a:r>
+            <a:r>
+              <a:rPr lang="en-US" sz="2000" dirty="0">
+                <a:latin typeface="Times New Roman" pitchFamily="18" charset="0"/>
+                <a:cs typeface="Times New Roman" pitchFamily="18" charset="0"/>
+              </a:rPr>
+              <a:t>, Jennifer Lai, and </a:t>
+            </a:r>
+            <a:r>
+              <a:rPr lang="en-US" sz="2000" dirty="0" smtClean="0">
+                <a:latin typeface="Times New Roman" pitchFamily="18" charset="0"/>
+                <a:cs typeface="Times New Roman" pitchFamily="18" charset="0"/>
+              </a:rPr>
+              <a:t>Jennifer Lai </a:t>
+            </a:r>
+            <a:r>
+              <a:rPr lang="en-US" sz="2000" dirty="0" err="1" smtClean="0">
+                <a:latin typeface="Times New Roman" pitchFamily="18" charset="0"/>
+                <a:cs typeface="Times New Roman" pitchFamily="18" charset="0"/>
+              </a:rPr>
+              <a:t>Pheng</a:t>
+            </a:r>
+            <a:r>
+              <a:rPr lang="en-US" sz="2000" dirty="0" smtClean="0">
+                <a:latin typeface="Times New Roman" pitchFamily="18" charset="0"/>
+                <a:cs typeface="Times New Roman" pitchFamily="18" charset="0"/>
+              </a:rPr>
+              <a:t> </a:t>
+            </a:r>
+            <a:r>
+              <a:rPr lang="en-US" sz="2000" dirty="0">
+                <a:latin typeface="Times New Roman" pitchFamily="18" charset="0"/>
+                <a:cs typeface="Times New Roman" pitchFamily="18" charset="0"/>
+              </a:rPr>
+              <a:t>Kwan. 2000. A </a:t>
+            </a:r>
+            <a:r>
+              <a:rPr lang="en-US" sz="2000" dirty="0" smtClean="0">
+                <a:latin typeface="Times New Roman" pitchFamily="18" charset="0"/>
+                <a:cs typeface="Times New Roman" pitchFamily="18" charset="0"/>
+              </a:rPr>
+              <a:t> machine 	learning approach to answering </a:t>
+            </a:r>
+            <a:r>
+              <a:rPr lang="en-US" sz="2000" dirty="0">
+                <a:latin typeface="Times New Roman" pitchFamily="18" charset="0"/>
+                <a:cs typeface="Times New Roman" pitchFamily="18" charset="0"/>
+              </a:rPr>
+              <a:t>questions for reading </a:t>
+            </a:r>
+            <a:r>
+              <a:rPr lang="en-US" sz="2000" dirty="0" smtClean="0">
+                <a:latin typeface="Times New Roman" pitchFamily="18" charset="0"/>
+                <a:cs typeface="Times New Roman" pitchFamily="18" charset="0"/>
+              </a:rPr>
+              <a:t>comprehension tests</a:t>
+            </a:r>
+            <a:r>
+              <a:rPr lang="en-US" sz="2000" dirty="0">
+                <a:latin typeface="Times New Roman" pitchFamily="18" charset="0"/>
+                <a:cs typeface="Times New Roman" pitchFamily="18" charset="0"/>
+              </a:rPr>
+              <a:t>. </a:t>
+            </a:r>
+            <a:r>
+              <a:rPr lang="en-US" sz="2000" dirty="0" smtClean="0">
+                <a:latin typeface="Times New Roman" pitchFamily="18" charset="0"/>
+                <a:cs typeface="Times New Roman" pitchFamily="18" charset="0"/>
+              </a:rPr>
+              <a:t>In 	Proceedings of EMNLP/VLC-2000 at ACL-2000.</a:t>
+            </a:r>
+          </a:p>
+          <a:p>
+            <a:pPr marL="0" indent="0">
+              <a:buNone/>
+            </a:pPr>
+            <a:r>
+              <a:rPr lang="en-US" sz="2000" dirty="0">
+                <a:latin typeface="Times New Roman" pitchFamily="18" charset="0"/>
+                <a:cs typeface="Times New Roman" pitchFamily="18" charset="0"/>
+              </a:rPr>
+              <a:t>[5] J. Ross Quinlan. 1993. C4.5: programs for </a:t>
+            </a:r>
+            <a:r>
+              <a:rPr lang="en-US" sz="2000" dirty="0" smtClean="0">
+                <a:latin typeface="Times New Roman" pitchFamily="18" charset="0"/>
+                <a:cs typeface="Times New Roman" pitchFamily="18" charset="0"/>
+              </a:rPr>
+              <a:t>machine learning</a:t>
+            </a:r>
+            <a:r>
+              <a:rPr lang="en-US" sz="2000" dirty="0">
+                <a:latin typeface="Times New Roman" pitchFamily="18" charset="0"/>
+                <a:cs typeface="Times New Roman" pitchFamily="18" charset="0"/>
+              </a:rPr>
+              <a:t>. </a:t>
+            </a:r>
+            <a:r>
+              <a:rPr lang="en-US" sz="2000" dirty="0" smtClean="0">
+                <a:latin typeface="Times New Roman" pitchFamily="18" charset="0"/>
+                <a:cs typeface="Times New Roman" pitchFamily="18" charset="0"/>
+              </a:rPr>
+              <a:t>Morgan  Kaufmann </a:t>
+            </a:r>
+            <a:r>
+              <a:rPr lang="en-US" sz="2000" dirty="0">
+                <a:latin typeface="Times New Roman" pitchFamily="18" charset="0"/>
+                <a:cs typeface="Times New Roman" pitchFamily="18" charset="0"/>
+              </a:rPr>
+              <a:t>Publishers Inc., </a:t>
+            </a:r>
+            <a:r>
+              <a:rPr lang="en-US" sz="2000" dirty="0" smtClean="0">
+                <a:latin typeface="Times New Roman" pitchFamily="18" charset="0"/>
+                <a:cs typeface="Times New Roman" pitchFamily="18" charset="0"/>
+              </a:rPr>
+              <a:t>	San Francisco</a:t>
+            </a:r>
+            <a:r>
+              <a:rPr lang="en-US" sz="2000" dirty="0">
+                <a:latin typeface="Times New Roman" pitchFamily="18" charset="0"/>
+                <a:cs typeface="Times New Roman" pitchFamily="18" charset="0"/>
+              </a:rPr>
+              <a:t>, </a:t>
+            </a:r>
+            <a:r>
+              <a:rPr lang="en-US" sz="2000" dirty="0" smtClean="0">
+                <a:latin typeface="Times New Roman" pitchFamily="18" charset="0"/>
+                <a:cs typeface="Times New Roman" pitchFamily="18" charset="0"/>
+              </a:rPr>
+              <a:t>CA, USA</a:t>
+            </a:r>
+          </a:p>
+          <a:p>
+            <a:pPr marL="0" indent="0">
+              <a:buNone/>
+            </a:pPr>
+            <a:r>
+              <a:rPr lang="en-US" sz="2000" dirty="0">
+                <a:latin typeface="Times New Roman" pitchFamily="18" charset="0"/>
+                <a:cs typeface="Times New Roman" pitchFamily="18" charset="0"/>
+              </a:rPr>
+              <a:t>[6] Ellen </a:t>
+            </a:r>
+            <a:r>
+              <a:rPr lang="en-US" sz="2000" dirty="0" err="1">
+                <a:latin typeface="Times New Roman" pitchFamily="18" charset="0"/>
+                <a:cs typeface="Times New Roman" pitchFamily="18" charset="0"/>
+              </a:rPr>
+              <a:t>Riloff</a:t>
+            </a:r>
+            <a:r>
+              <a:rPr lang="en-US" sz="2000" dirty="0">
+                <a:latin typeface="Times New Roman" pitchFamily="18" charset="0"/>
+                <a:cs typeface="Times New Roman" pitchFamily="18" charset="0"/>
+              </a:rPr>
+              <a:t> and Michael </a:t>
+            </a:r>
+            <a:r>
+              <a:rPr lang="en-US" sz="2000" dirty="0" err="1">
+                <a:latin typeface="Times New Roman" pitchFamily="18" charset="0"/>
+                <a:cs typeface="Times New Roman" pitchFamily="18" charset="0"/>
+              </a:rPr>
+              <a:t>Thelen</a:t>
+            </a:r>
+            <a:r>
+              <a:rPr lang="en-US" sz="2000" dirty="0">
+                <a:latin typeface="Times New Roman" pitchFamily="18" charset="0"/>
+                <a:cs typeface="Times New Roman" pitchFamily="18" charset="0"/>
+              </a:rPr>
+              <a:t>. 2000. A </a:t>
+            </a:r>
+            <a:r>
+              <a:rPr lang="en-US" sz="2000" dirty="0" smtClean="0">
+                <a:latin typeface="Times New Roman" pitchFamily="18" charset="0"/>
+                <a:cs typeface="Times New Roman" pitchFamily="18" charset="0"/>
+              </a:rPr>
+              <a:t>rule-based question </a:t>
+            </a:r>
+            <a:r>
+              <a:rPr lang="en-US" sz="2000" dirty="0">
+                <a:latin typeface="Times New Roman" pitchFamily="18" charset="0"/>
+                <a:cs typeface="Times New Roman" pitchFamily="18" charset="0"/>
+              </a:rPr>
+              <a:t>answering system for </a:t>
+            </a:r>
+            <a:r>
+              <a:rPr lang="en-US" sz="2000" dirty="0" smtClean="0">
+                <a:latin typeface="Times New Roman" pitchFamily="18" charset="0"/>
+                <a:cs typeface="Times New Roman" pitchFamily="18" charset="0"/>
+              </a:rPr>
+              <a:t>reading 	comprehension tests</a:t>
+            </a:r>
+            <a:r>
+              <a:rPr lang="en-US" sz="2000" dirty="0">
+                <a:latin typeface="Times New Roman" pitchFamily="18" charset="0"/>
+                <a:cs typeface="Times New Roman" pitchFamily="18" charset="0"/>
+              </a:rPr>
+              <a:t>. In </a:t>
+            </a:r>
+            <a:r>
+              <a:rPr lang="en-US" sz="2000" dirty="0" smtClean="0">
+                <a:latin typeface="Times New Roman" pitchFamily="18" charset="0"/>
+                <a:cs typeface="Times New Roman" pitchFamily="18" charset="0"/>
+              </a:rPr>
+              <a:t>	Proceedings </a:t>
+            </a:r>
+            <a:r>
+              <a:rPr lang="en-US" sz="2000" dirty="0">
+                <a:latin typeface="Times New Roman" pitchFamily="18" charset="0"/>
+                <a:cs typeface="Times New Roman" pitchFamily="18" charset="0"/>
+              </a:rPr>
+              <a:t>of the 2000 ANLP/NAACL </a:t>
+            </a:r>
+            <a:r>
+              <a:rPr lang="en-US" sz="2000" dirty="0" smtClean="0">
+                <a:latin typeface="Times New Roman" pitchFamily="18" charset="0"/>
+                <a:cs typeface="Times New Roman" pitchFamily="18" charset="0"/>
+              </a:rPr>
+              <a:t>Workshop on </a:t>
+            </a:r>
+            <a:r>
+              <a:rPr lang="en-US" sz="2000" dirty="0">
+                <a:latin typeface="Times New Roman" pitchFamily="18" charset="0"/>
+                <a:cs typeface="Times New Roman" pitchFamily="18" charset="0"/>
+              </a:rPr>
+              <a:t>Reading </a:t>
+            </a:r>
+            <a:r>
+              <a:rPr lang="en-US" sz="2000" dirty="0" smtClean="0">
+                <a:latin typeface="Times New Roman" pitchFamily="18" charset="0"/>
+                <a:cs typeface="Times New Roman" pitchFamily="18" charset="0"/>
+              </a:rPr>
+              <a:t>	comprehension </a:t>
+            </a:r>
+            <a:r>
+              <a:rPr lang="en-US" sz="2000" dirty="0">
+                <a:latin typeface="Times New Roman" pitchFamily="18" charset="0"/>
+                <a:cs typeface="Times New Roman" pitchFamily="18" charset="0"/>
+              </a:rPr>
+              <a:t>tests as evaluation </a:t>
+            </a:r>
+            <a:r>
+              <a:rPr lang="en-US" sz="2000" dirty="0" smtClean="0">
+                <a:latin typeface="Times New Roman" pitchFamily="18" charset="0"/>
+                <a:cs typeface="Times New Roman" pitchFamily="18" charset="0"/>
+              </a:rPr>
+              <a:t>for computer-based </a:t>
+            </a:r>
+            <a:r>
+              <a:rPr lang="en-US" sz="2000" dirty="0">
+                <a:latin typeface="Times New Roman" pitchFamily="18" charset="0"/>
+                <a:cs typeface="Times New Roman" pitchFamily="18" charset="0"/>
+              </a:rPr>
+              <a:t>language understanding </a:t>
+            </a:r>
+            <a:r>
+              <a:rPr lang="en-US" sz="2000" dirty="0" err="1">
+                <a:latin typeface="Times New Roman" pitchFamily="18" charset="0"/>
+                <a:cs typeface="Times New Roman" pitchFamily="18" charset="0"/>
+              </a:rPr>
+              <a:t>sytems</a:t>
+            </a:r>
+            <a:r>
+              <a:rPr lang="en-US" sz="2000" dirty="0">
+                <a:latin typeface="Times New Roman" pitchFamily="18" charset="0"/>
+                <a:cs typeface="Times New Roman" pitchFamily="18" charset="0"/>
+              </a:rPr>
+              <a:t> </a:t>
+            </a:r>
+            <a:r>
+              <a:rPr lang="en-US" sz="2000" dirty="0" smtClean="0">
+                <a:latin typeface="Times New Roman" pitchFamily="18" charset="0"/>
+                <a:cs typeface="Times New Roman" pitchFamily="18" charset="0"/>
+              </a:rPr>
+              <a:t>– 	Volume 6</a:t>
+            </a:r>
+            <a:r>
+              <a:rPr lang="en-US" sz="2000" dirty="0">
+                <a:latin typeface="Times New Roman" pitchFamily="18" charset="0"/>
+                <a:cs typeface="Times New Roman" pitchFamily="18" charset="0"/>
+              </a:rPr>
+              <a:t>, ANLP/NAACL-</a:t>
+            </a:r>
+            <a:r>
+              <a:rPr lang="en-US" sz="2000" dirty="0" err="1">
+                <a:latin typeface="Times New Roman" pitchFamily="18" charset="0"/>
+                <a:cs typeface="Times New Roman" pitchFamily="18" charset="0"/>
+              </a:rPr>
+              <a:t>ReadingComp</a:t>
+            </a:r>
+            <a:r>
+              <a:rPr lang="en-US" sz="2000" dirty="0">
+                <a:latin typeface="Times New Roman" pitchFamily="18" charset="0"/>
+                <a:cs typeface="Times New Roman" pitchFamily="18" charset="0"/>
+              </a:rPr>
+              <a:t> ’00, pages </a:t>
+            </a:r>
+            <a:r>
+              <a:rPr lang="en-US" sz="2000" dirty="0" smtClean="0">
+                <a:latin typeface="Times New Roman" pitchFamily="18" charset="0"/>
+                <a:cs typeface="Times New Roman" pitchFamily="18" charset="0"/>
+              </a:rPr>
+              <a:t>13–19</a:t>
+            </a:r>
+            <a:r>
+              <a:rPr lang="en-US" sz="2000" dirty="0">
+                <a:latin typeface="Times New Roman" pitchFamily="18" charset="0"/>
+                <a:cs typeface="Times New Roman" pitchFamily="18" charset="0"/>
+              </a:rPr>
+              <a:t>, Stroudsburg, PA, USA. </a:t>
+            </a:r>
+            <a:r>
+              <a:rPr lang="en-US" sz="2000" dirty="0" smtClean="0">
+                <a:latin typeface="Times New Roman" pitchFamily="18" charset="0"/>
+                <a:cs typeface="Times New Roman" pitchFamily="18" charset="0"/>
+              </a:rPr>
+              <a:t>	Association </a:t>
+            </a:r>
+            <a:r>
+              <a:rPr lang="en-US" sz="2000" dirty="0">
+                <a:latin typeface="Times New Roman" pitchFamily="18" charset="0"/>
+                <a:cs typeface="Times New Roman" pitchFamily="18" charset="0"/>
+              </a:rPr>
+              <a:t>for </a:t>
+            </a:r>
+            <a:r>
+              <a:rPr lang="en-US" sz="2000" dirty="0" smtClean="0">
+                <a:latin typeface="Times New Roman" pitchFamily="18" charset="0"/>
+                <a:cs typeface="Times New Roman" pitchFamily="18" charset="0"/>
+              </a:rPr>
+              <a:t>Computational Linguistics.</a:t>
+            </a:r>
+          </a:p>
+          <a:p>
+            <a:pPr marL="0" indent="0">
+              <a:buNone/>
+            </a:pPr>
+            <a:r>
+              <a:rPr lang="en-US" sz="2000" dirty="0">
+                <a:latin typeface="Times New Roman" pitchFamily="18" charset="0"/>
+                <a:cs typeface="Times New Roman" pitchFamily="18" charset="0"/>
+              </a:rPr>
+              <a:t>[7] M. </a:t>
+            </a:r>
+            <a:r>
+              <a:rPr lang="en-US" sz="2000" dirty="0" err="1">
+                <a:latin typeface="Times New Roman" pitchFamily="18" charset="0"/>
+                <a:cs typeface="Times New Roman" pitchFamily="18" charset="0"/>
+              </a:rPr>
+              <a:t>Rotaru</a:t>
+            </a:r>
+            <a:r>
+              <a:rPr lang="en-US" sz="2000" dirty="0">
+                <a:latin typeface="Times New Roman" pitchFamily="18" charset="0"/>
+                <a:cs typeface="Times New Roman" pitchFamily="18" charset="0"/>
+              </a:rPr>
+              <a:t> and D.J. </a:t>
+            </a:r>
+            <a:r>
+              <a:rPr lang="en-US" sz="2000" dirty="0" err="1">
+                <a:latin typeface="Times New Roman" pitchFamily="18" charset="0"/>
+                <a:cs typeface="Times New Roman" pitchFamily="18" charset="0"/>
+              </a:rPr>
+              <a:t>Litman</a:t>
+            </a:r>
+            <a:r>
+              <a:rPr lang="en-US" sz="2000" dirty="0">
+                <a:latin typeface="Times New Roman" pitchFamily="18" charset="0"/>
+                <a:cs typeface="Times New Roman" pitchFamily="18" charset="0"/>
+              </a:rPr>
+              <a:t>. 2005. Improving </a:t>
+            </a:r>
+            <a:r>
+              <a:rPr lang="en-US" sz="2000" dirty="0" smtClean="0">
+                <a:latin typeface="Times New Roman" pitchFamily="18" charset="0"/>
+                <a:cs typeface="Times New Roman" pitchFamily="18" charset="0"/>
+              </a:rPr>
+              <a:t>Question Answering </a:t>
+            </a:r>
+            <a:r>
+              <a:rPr lang="en-US" sz="2000" dirty="0">
+                <a:latin typeface="Times New Roman" pitchFamily="18" charset="0"/>
+                <a:cs typeface="Times New Roman" pitchFamily="18" charset="0"/>
+              </a:rPr>
+              <a:t>for Reading Comprehension </a:t>
+            </a:r>
+            <a:r>
+              <a:rPr lang="en-US" sz="2000" dirty="0" smtClean="0">
+                <a:latin typeface="Times New Roman" pitchFamily="18" charset="0"/>
+                <a:cs typeface="Times New Roman" pitchFamily="18" charset="0"/>
+              </a:rPr>
+              <a:t>	Tests by Combining </a:t>
+            </a:r>
+            <a:r>
+              <a:rPr lang="en-US" sz="2000" dirty="0">
+                <a:latin typeface="Times New Roman" pitchFamily="18" charset="0"/>
+                <a:cs typeface="Times New Roman" pitchFamily="18" charset="0"/>
+              </a:rPr>
+              <a:t>Multiple Systems. In Proceedings </a:t>
+            </a:r>
+            <a:r>
+              <a:rPr lang="en-US" sz="2000" dirty="0" smtClean="0">
+                <a:latin typeface="Times New Roman" pitchFamily="18" charset="0"/>
+                <a:cs typeface="Times New Roman" pitchFamily="18" charset="0"/>
+              </a:rPr>
+              <a:t>of the </a:t>
+            </a:r>
+            <a:r>
+              <a:rPr lang="en-US" sz="2000" dirty="0">
+                <a:latin typeface="Times New Roman" pitchFamily="18" charset="0"/>
+                <a:cs typeface="Times New Roman" pitchFamily="18" charset="0"/>
+              </a:rPr>
+              <a:t>American Association for </a:t>
+            </a:r>
+            <a:r>
+              <a:rPr lang="en-US" sz="2000" dirty="0" smtClean="0">
+                <a:latin typeface="Times New Roman" pitchFamily="18" charset="0"/>
+                <a:cs typeface="Times New Roman" pitchFamily="18" charset="0"/>
+              </a:rPr>
+              <a:t>	Artificial Intelligence: Workshop </a:t>
+            </a:r>
+            <a:r>
+              <a:rPr lang="en-US" sz="2000" dirty="0">
+                <a:latin typeface="Times New Roman" pitchFamily="18" charset="0"/>
+                <a:cs typeface="Times New Roman" pitchFamily="18" charset="0"/>
+              </a:rPr>
+              <a:t>on Question Answering in Restricted Domains</a:t>
+            </a:r>
+            <a:r>
+              <a:rPr lang="en-US" sz="2000" dirty="0" smtClean="0">
+                <a:latin typeface="Times New Roman" pitchFamily="18" charset="0"/>
+                <a:cs typeface="Times New Roman" pitchFamily="18" charset="0"/>
+              </a:rPr>
+              <a:t>.</a:t>
+            </a:r>
+          </a:p>
+          <a:p>
+            <a:pPr marL="0" indent="0">
+              <a:buNone/>
+            </a:pPr>
+            <a:r>
+              <a:rPr lang="en-US" sz="2000" dirty="0">
+                <a:latin typeface="Times New Roman" pitchFamily="18" charset="0"/>
+                <a:cs typeface="Times New Roman" pitchFamily="18" charset="0"/>
+              </a:rPr>
+              <a:t>[8] Kristina </a:t>
+            </a:r>
+            <a:r>
+              <a:rPr lang="en-US" sz="2000" dirty="0" err="1">
+                <a:latin typeface="Times New Roman" pitchFamily="18" charset="0"/>
+                <a:cs typeface="Times New Roman" pitchFamily="18" charset="0"/>
+              </a:rPr>
+              <a:t>Toutanova</a:t>
+            </a:r>
+            <a:r>
+              <a:rPr lang="en-US" sz="2000" dirty="0">
+                <a:latin typeface="Times New Roman" pitchFamily="18" charset="0"/>
+                <a:cs typeface="Times New Roman" pitchFamily="18" charset="0"/>
+              </a:rPr>
+              <a:t> and Christopher D. Manning. </a:t>
+            </a:r>
+            <a:r>
+              <a:rPr lang="en-US" sz="2000" dirty="0" smtClean="0">
+                <a:latin typeface="Times New Roman" pitchFamily="18" charset="0"/>
+                <a:cs typeface="Times New Roman" pitchFamily="18" charset="0"/>
+              </a:rPr>
+              <a:t>2000. Enriching </a:t>
+            </a:r>
+            <a:r>
+              <a:rPr lang="en-US" sz="2000" dirty="0">
+                <a:latin typeface="Times New Roman" pitchFamily="18" charset="0"/>
+                <a:cs typeface="Times New Roman" pitchFamily="18" charset="0"/>
+              </a:rPr>
+              <a:t>the knowledge sources used in a </a:t>
+            </a:r>
+            <a:r>
+              <a:rPr lang="en-US" sz="2000" dirty="0" smtClean="0">
+                <a:latin typeface="Times New Roman" pitchFamily="18" charset="0"/>
+                <a:cs typeface="Times New Roman" pitchFamily="18" charset="0"/>
+              </a:rPr>
+              <a:t>	maximum entropy </a:t>
+            </a:r>
+            <a:r>
+              <a:rPr lang="en-US" sz="2000" dirty="0">
+                <a:latin typeface="Times New Roman" pitchFamily="18" charset="0"/>
+                <a:cs typeface="Times New Roman" pitchFamily="18" charset="0"/>
+              </a:rPr>
+              <a:t>part-of-speech tagger. </a:t>
+            </a:r>
+            <a:r>
+              <a:rPr lang="en-US" sz="2000" dirty="0" smtClean="0">
+                <a:latin typeface="Times New Roman" pitchFamily="18" charset="0"/>
+                <a:cs typeface="Times New Roman" pitchFamily="18" charset="0"/>
+              </a:rPr>
+              <a:t>In EMNLP/VLC 2000</a:t>
+            </a:r>
+            <a:r>
+              <a:rPr lang="en-US" sz="2000" dirty="0">
+                <a:latin typeface="Times New Roman" pitchFamily="18" charset="0"/>
+                <a:cs typeface="Times New Roman" pitchFamily="18" charset="0"/>
+              </a:rPr>
+              <a:t>, pages 63–70.</a:t>
+            </a:r>
+          </a:p>
+        </p:txBody>
+      </p:sp>
+      <p:sp>
+        <p:nvSpPr>
+          <p:cNvPr id="4" name="Rectangle 3"/>
+          <p:cNvSpPr/>
+          <p:nvPr/>
+        </p:nvSpPr>
+        <p:spPr>
+          <a:xfrm rot="5400000">
+            <a:off x="-2417380" y="2793492"/>
+            <a:ext cx="5967984" cy="381000"/>
+          </a:xfrm>
+          <a:prstGeom prst="rect">
+            <a:avLst/>
+          </a:prstGeom>
+          <a:gradFill flip="none" rotWithShape="1">
+            <a:gsLst>
+              <a:gs pos="100000">
+                <a:srgbClr val="EEDC82"/>
+              </a:gs>
+              <a:gs pos="0">
+                <a:srgbClr val="D2DDF1"/>
+              </a:gs>
+              <a:gs pos="0">
+                <a:schemeClr val="tx2"/>
+              </a:gs>
+            </a:gsLst>
+            <a:lin ang="0" scaled="1"/>
+            <a:tileRect/>
+          </a:gradFill>
+          <a:ln>
+            <a:noFill/>
+          </a:ln>
+        </p:spPr>
+        <p:style>
+          <a:lnRef idx="2">
+            <a:schemeClr val="accent1">
+              <a:shade val="50000"/>
+            </a:schemeClr>
+          </a:lnRef>
+          <a:fillRef idx="1">
+            <a:schemeClr val="accent1"/>
+          </a:fillRef>
+          <a:effectRef idx="0">
+            <a:schemeClr val="accent1"/>
+          </a:effectRef>
+          <a:fontRef idx="minor">
+            <a:schemeClr val="lt1"/>
+          </a:fontRef>
+        </p:style>
+        <p:txBody>
+          <a:bodyPr rtlCol="0" anchor="ctr"/>
+          <a:lstStyle/>
+          <a:p>
+            <a:pPr algn="ctr"/>
+            <a:endParaRPr lang="en-US"/>
+          </a:p>
+        </p:txBody>
+      </p:sp>
+      <p:sp>
+        <p:nvSpPr>
+          <p:cNvPr id="5" name="Rectangle 4"/>
+          <p:cNvSpPr/>
+          <p:nvPr/>
+        </p:nvSpPr>
+        <p:spPr>
+          <a:xfrm rot="10800000">
+            <a:off x="961960" y="6096003"/>
+            <a:ext cx="8178992" cy="381000"/>
+          </a:xfrm>
+          <a:prstGeom prst="rect">
+            <a:avLst/>
+          </a:prstGeom>
+          <a:gradFill flip="none" rotWithShape="1">
+            <a:gsLst>
+              <a:gs pos="100000">
+                <a:srgbClr val="EEDC82"/>
+              </a:gs>
+              <a:gs pos="0">
+                <a:srgbClr val="D2DDF1"/>
+              </a:gs>
+              <a:gs pos="0">
+                <a:schemeClr val="tx2"/>
+              </a:gs>
+            </a:gsLst>
+            <a:lin ang="0" scaled="1"/>
+            <a:tileRect/>
+          </a:gradFill>
+          <a:ln>
+            <a:noFill/>
+          </a:ln>
+        </p:spPr>
+        <p:style>
+          <a:lnRef idx="2">
+            <a:schemeClr val="accent1">
+              <a:shade val="50000"/>
+            </a:schemeClr>
+          </a:lnRef>
+          <a:fillRef idx="1">
+            <a:schemeClr val="accent1"/>
+          </a:fillRef>
+          <a:effectRef idx="0">
+            <a:schemeClr val="accent1"/>
+          </a:effectRef>
+          <a:fontRef idx="minor">
+            <a:schemeClr val="lt1"/>
+          </a:fontRef>
+        </p:style>
+        <p:txBody>
+          <a:bodyPr rtlCol="0" anchor="ctr"/>
+          <a:lstStyle/>
+          <a:p>
+            <a:pPr algn="ctr"/>
+            <a:endParaRPr lang="en-US"/>
+          </a:p>
+        </p:txBody>
+      </p:sp>
+      <p:pic>
+        <p:nvPicPr>
+          <p:cNvPr id="6" name="Picture 5"/>
+          <p:cNvPicPr>
+            <a:picLocks noChangeAspect="1"/>
+          </p:cNvPicPr>
+          <p:nvPr/>
+        </p:nvPicPr>
+        <p:blipFill>
+          <a:blip r:embed="rId2">
+            <a:extLst>
+              <a:ext uri="{28A0092B-C50C-407E-A947-70E740481C1C}">
+                <a14:useLocalDpi xmlns:a14="http://schemas.microsoft.com/office/drawing/2010/main" val="0"/>
+              </a:ext>
+            </a:extLst>
+          </a:blip>
+          <a:stretch>
+            <a:fillRect/>
+          </a:stretch>
+        </p:blipFill>
+        <p:spPr>
+          <a:xfrm>
+            <a:off x="73152" y="5791200"/>
+            <a:ext cx="995759" cy="990600"/>
+          </a:xfrm>
+          <a:prstGeom prst="rect">
+            <a:avLst/>
+          </a:prstGeom>
+        </p:spPr>
+      </p:pic>
+    </p:spTree>
+    <p:extLst>
+      <p:ext uri="{BB962C8B-B14F-4D97-AF65-F5344CB8AC3E}">
+        <p14:creationId xmlns:p14="http://schemas.microsoft.com/office/powerpoint/2010/main" val="3746091129"/>
       </p:ext>
     </p:extLst>
   </p:cSld>

</xml_diff>

<commit_message>
a few small changes to slides
</commit_message>
<xml_diff>
--- a/presentation/DeanQA.pptx
+++ b/presentation/DeanQA.pptx
@@ -300,7 +300,8 @@
           <a:p>
             <a:fld id="{B4F56C3E-8310-43F1-8657-0BE50A775DA8}" type="datetimeFigureOut">
               <a:rPr lang="en-US" smtClean="0"/>
-              <a:t>12/10/2011</a:t>
+              <a:pPr/>
+              <a:t>12/11/2011</a:t>
             </a:fld>
             <a:endParaRPr lang="en-US"/>
           </a:p>
@@ -342,6 +343,7 @@
           <a:p>
             <a:fld id="{A0B17CF9-29C7-47E6-A9E3-BD947ED590AB}" type="slidenum">
               <a:rPr lang="en-US" smtClean="0"/>
+              <a:pPr/>
               <a:t>‹#›</a:t>
             </a:fld>
             <a:endParaRPr lang="en-US"/>
@@ -351,7 +353,7 @@
     </p:spTree>
     <p:extLst>
       <p:ext uri="{BB962C8B-B14F-4D97-AF65-F5344CB8AC3E}">
-        <p14:creationId xmlns:p14="http://schemas.microsoft.com/office/powerpoint/2010/main" val="2758009127"/>
+        <p14:creationId xmlns:p14="http://schemas.microsoft.com/office/powerpoint/2010/main" xmlns="" val="2758009127"/>
       </p:ext>
     </p:extLst>
   </p:cSld>
@@ -470,7 +472,8 @@
           <a:p>
             <a:fld id="{B4F56C3E-8310-43F1-8657-0BE50A775DA8}" type="datetimeFigureOut">
               <a:rPr lang="en-US" smtClean="0"/>
-              <a:t>12/10/2011</a:t>
+              <a:pPr/>
+              <a:t>12/11/2011</a:t>
             </a:fld>
             <a:endParaRPr lang="en-US"/>
           </a:p>
@@ -512,6 +515,7 @@
           <a:p>
             <a:fld id="{A0B17CF9-29C7-47E6-A9E3-BD947ED590AB}" type="slidenum">
               <a:rPr lang="en-US" smtClean="0"/>
+              <a:pPr/>
               <a:t>‹#›</a:t>
             </a:fld>
             <a:endParaRPr lang="en-US"/>
@@ -521,7 +525,7 @@
     </p:spTree>
     <p:extLst>
       <p:ext uri="{BB962C8B-B14F-4D97-AF65-F5344CB8AC3E}">
-        <p14:creationId xmlns:p14="http://schemas.microsoft.com/office/powerpoint/2010/main" val="2885854924"/>
+        <p14:creationId xmlns:p14="http://schemas.microsoft.com/office/powerpoint/2010/main" xmlns="" val="2885854924"/>
       </p:ext>
     </p:extLst>
   </p:cSld>
@@ -650,7 +654,8 @@
           <a:p>
             <a:fld id="{B4F56C3E-8310-43F1-8657-0BE50A775DA8}" type="datetimeFigureOut">
               <a:rPr lang="en-US" smtClean="0"/>
-              <a:t>12/10/2011</a:t>
+              <a:pPr/>
+              <a:t>12/11/2011</a:t>
             </a:fld>
             <a:endParaRPr lang="en-US"/>
           </a:p>
@@ -692,6 +697,7 @@
           <a:p>
             <a:fld id="{A0B17CF9-29C7-47E6-A9E3-BD947ED590AB}" type="slidenum">
               <a:rPr lang="en-US" smtClean="0"/>
+              <a:pPr/>
               <a:t>‹#›</a:t>
             </a:fld>
             <a:endParaRPr lang="en-US"/>
@@ -701,7 +707,7 @@
     </p:spTree>
     <p:extLst>
       <p:ext uri="{BB962C8B-B14F-4D97-AF65-F5344CB8AC3E}">
-        <p14:creationId xmlns:p14="http://schemas.microsoft.com/office/powerpoint/2010/main" val="1667071680"/>
+        <p14:creationId xmlns:p14="http://schemas.microsoft.com/office/powerpoint/2010/main" xmlns="" val="1667071680"/>
       </p:ext>
     </p:extLst>
   </p:cSld>
@@ -820,7 +826,8 @@
           <a:p>
             <a:fld id="{B4F56C3E-8310-43F1-8657-0BE50A775DA8}" type="datetimeFigureOut">
               <a:rPr lang="en-US" smtClean="0"/>
-              <a:t>12/10/2011</a:t>
+              <a:pPr/>
+              <a:t>12/11/2011</a:t>
             </a:fld>
             <a:endParaRPr lang="en-US"/>
           </a:p>
@@ -862,6 +869,7 @@
           <a:p>
             <a:fld id="{A0B17CF9-29C7-47E6-A9E3-BD947ED590AB}" type="slidenum">
               <a:rPr lang="en-US" smtClean="0"/>
+              <a:pPr/>
               <a:t>‹#›</a:t>
             </a:fld>
             <a:endParaRPr lang="en-US"/>
@@ -871,7 +879,7 @@
     </p:spTree>
     <p:extLst>
       <p:ext uri="{BB962C8B-B14F-4D97-AF65-F5344CB8AC3E}">
-        <p14:creationId xmlns:p14="http://schemas.microsoft.com/office/powerpoint/2010/main" val="2288510995"/>
+        <p14:creationId xmlns:p14="http://schemas.microsoft.com/office/powerpoint/2010/main" xmlns="" val="2288510995"/>
       </p:ext>
     </p:extLst>
   </p:cSld>
@@ -1066,7 +1074,8 @@
           <a:p>
             <a:fld id="{B4F56C3E-8310-43F1-8657-0BE50A775DA8}" type="datetimeFigureOut">
               <a:rPr lang="en-US" smtClean="0"/>
-              <a:t>12/10/2011</a:t>
+              <a:pPr/>
+              <a:t>12/11/2011</a:t>
             </a:fld>
             <a:endParaRPr lang="en-US"/>
           </a:p>
@@ -1108,6 +1117,7 @@
           <a:p>
             <a:fld id="{A0B17CF9-29C7-47E6-A9E3-BD947ED590AB}" type="slidenum">
               <a:rPr lang="en-US" smtClean="0"/>
+              <a:pPr/>
               <a:t>‹#›</a:t>
             </a:fld>
             <a:endParaRPr lang="en-US"/>
@@ -1117,7 +1127,7 @@
     </p:spTree>
     <p:extLst>
       <p:ext uri="{BB962C8B-B14F-4D97-AF65-F5344CB8AC3E}">
-        <p14:creationId xmlns:p14="http://schemas.microsoft.com/office/powerpoint/2010/main" val="2098015468"/>
+        <p14:creationId xmlns:p14="http://schemas.microsoft.com/office/powerpoint/2010/main" xmlns="" val="2098015468"/>
       </p:ext>
     </p:extLst>
   </p:cSld>
@@ -1354,7 +1364,8 @@
           <a:p>
             <a:fld id="{B4F56C3E-8310-43F1-8657-0BE50A775DA8}" type="datetimeFigureOut">
               <a:rPr lang="en-US" smtClean="0"/>
-              <a:t>12/10/2011</a:t>
+              <a:pPr/>
+              <a:t>12/11/2011</a:t>
             </a:fld>
             <a:endParaRPr lang="en-US"/>
           </a:p>
@@ -1396,6 +1407,7 @@
           <a:p>
             <a:fld id="{A0B17CF9-29C7-47E6-A9E3-BD947ED590AB}" type="slidenum">
               <a:rPr lang="en-US" smtClean="0"/>
+              <a:pPr/>
               <a:t>‹#›</a:t>
             </a:fld>
             <a:endParaRPr lang="en-US"/>
@@ -1405,7 +1417,7 @@
     </p:spTree>
     <p:extLst>
       <p:ext uri="{BB962C8B-B14F-4D97-AF65-F5344CB8AC3E}">
-        <p14:creationId xmlns:p14="http://schemas.microsoft.com/office/powerpoint/2010/main" val="2136444614"/>
+        <p14:creationId xmlns:p14="http://schemas.microsoft.com/office/powerpoint/2010/main" xmlns="" val="2136444614"/>
       </p:ext>
     </p:extLst>
   </p:cSld>
@@ -1776,7 +1788,8 @@
           <a:p>
             <a:fld id="{B4F56C3E-8310-43F1-8657-0BE50A775DA8}" type="datetimeFigureOut">
               <a:rPr lang="en-US" smtClean="0"/>
-              <a:t>12/10/2011</a:t>
+              <a:pPr/>
+              <a:t>12/11/2011</a:t>
             </a:fld>
             <a:endParaRPr lang="en-US"/>
           </a:p>
@@ -1818,6 +1831,7 @@
           <a:p>
             <a:fld id="{A0B17CF9-29C7-47E6-A9E3-BD947ED590AB}" type="slidenum">
               <a:rPr lang="en-US" smtClean="0"/>
+              <a:pPr/>
               <a:t>‹#›</a:t>
             </a:fld>
             <a:endParaRPr lang="en-US"/>
@@ -1827,7 +1841,7 @@
     </p:spTree>
     <p:extLst>
       <p:ext uri="{BB962C8B-B14F-4D97-AF65-F5344CB8AC3E}">
-        <p14:creationId xmlns:p14="http://schemas.microsoft.com/office/powerpoint/2010/main" val="2665938388"/>
+        <p14:creationId xmlns:p14="http://schemas.microsoft.com/office/powerpoint/2010/main" xmlns="" val="2665938388"/>
       </p:ext>
     </p:extLst>
   </p:cSld>
@@ -1894,7 +1908,8 @@
           <a:p>
             <a:fld id="{B4F56C3E-8310-43F1-8657-0BE50A775DA8}" type="datetimeFigureOut">
               <a:rPr lang="en-US" smtClean="0"/>
-              <a:t>12/10/2011</a:t>
+              <a:pPr/>
+              <a:t>12/11/2011</a:t>
             </a:fld>
             <a:endParaRPr lang="en-US"/>
           </a:p>
@@ -1936,6 +1951,7 @@
           <a:p>
             <a:fld id="{A0B17CF9-29C7-47E6-A9E3-BD947ED590AB}" type="slidenum">
               <a:rPr lang="en-US" smtClean="0"/>
+              <a:pPr/>
               <a:t>‹#›</a:t>
             </a:fld>
             <a:endParaRPr lang="en-US"/>
@@ -1945,7 +1961,7 @@
     </p:spTree>
     <p:extLst>
       <p:ext uri="{BB962C8B-B14F-4D97-AF65-F5344CB8AC3E}">
-        <p14:creationId xmlns:p14="http://schemas.microsoft.com/office/powerpoint/2010/main" val="61385920"/>
+        <p14:creationId xmlns:p14="http://schemas.microsoft.com/office/powerpoint/2010/main" xmlns="" val="61385920"/>
       </p:ext>
     </p:extLst>
   </p:cSld>
@@ -1989,7 +2005,8 @@
           <a:p>
             <a:fld id="{B4F56C3E-8310-43F1-8657-0BE50A775DA8}" type="datetimeFigureOut">
               <a:rPr lang="en-US" smtClean="0"/>
-              <a:t>12/10/2011</a:t>
+              <a:pPr/>
+              <a:t>12/11/2011</a:t>
             </a:fld>
             <a:endParaRPr lang="en-US"/>
           </a:p>
@@ -2031,6 +2048,7 @@
           <a:p>
             <a:fld id="{A0B17CF9-29C7-47E6-A9E3-BD947ED590AB}" type="slidenum">
               <a:rPr lang="en-US" smtClean="0"/>
+              <a:pPr/>
               <a:t>‹#›</a:t>
             </a:fld>
             <a:endParaRPr lang="en-US"/>
@@ -2040,7 +2058,7 @@
     </p:spTree>
     <p:extLst>
       <p:ext uri="{BB962C8B-B14F-4D97-AF65-F5344CB8AC3E}">
-        <p14:creationId xmlns:p14="http://schemas.microsoft.com/office/powerpoint/2010/main" val="1177843858"/>
+        <p14:creationId xmlns:p14="http://schemas.microsoft.com/office/powerpoint/2010/main" xmlns="" val="1177843858"/>
       </p:ext>
     </p:extLst>
   </p:cSld>
@@ -2266,7 +2284,8 @@
           <a:p>
             <a:fld id="{B4F56C3E-8310-43F1-8657-0BE50A775DA8}" type="datetimeFigureOut">
               <a:rPr lang="en-US" smtClean="0"/>
-              <a:t>12/10/2011</a:t>
+              <a:pPr/>
+              <a:t>12/11/2011</a:t>
             </a:fld>
             <a:endParaRPr lang="en-US"/>
           </a:p>
@@ -2308,6 +2327,7 @@
           <a:p>
             <a:fld id="{A0B17CF9-29C7-47E6-A9E3-BD947ED590AB}" type="slidenum">
               <a:rPr lang="en-US" smtClean="0"/>
+              <a:pPr/>
               <a:t>‹#›</a:t>
             </a:fld>
             <a:endParaRPr lang="en-US"/>
@@ -2317,7 +2337,7 @@
     </p:spTree>
     <p:extLst>
       <p:ext uri="{BB962C8B-B14F-4D97-AF65-F5344CB8AC3E}">
-        <p14:creationId xmlns:p14="http://schemas.microsoft.com/office/powerpoint/2010/main" val="325499151"/>
+        <p14:creationId xmlns:p14="http://schemas.microsoft.com/office/powerpoint/2010/main" xmlns="" val="325499151"/>
       </p:ext>
     </p:extLst>
   </p:cSld>
@@ -2523,7 +2543,8 @@
           <a:p>
             <a:fld id="{B4F56C3E-8310-43F1-8657-0BE50A775DA8}" type="datetimeFigureOut">
               <a:rPr lang="en-US" smtClean="0"/>
-              <a:t>12/10/2011</a:t>
+              <a:pPr/>
+              <a:t>12/11/2011</a:t>
             </a:fld>
             <a:endParaRPr lang="en-US"/>
           </a:p>
@@ -2565,6 +2586,7 @@
           <a:p>
             <a:fld id="{A0B17CF9-29C7-47E6-A9E3-BD947ED590AB}" type="slidenum">
               <a:rPr lang="en-US" smtClean="0"/>
+              <a:pPr/>
               <a:t>‹#›</a:t>
             </a:fld>
             <a:endParaRPr lang="en-US"/>
@@ -2574,7 +2596,7 @@
     </p:spTree>
     <p:extLst>
       <p:ext uri="{BB962C8B-B14F-4D97-AF65-F5344CB8AC3E}">
-        <p14:creationId xmlns:p14="http://schemas.microsoft.com/office/powerpoint/2010/main" val="315380917"/>
+        <p14:creationId xmlns:p14="http://schemas.microsoft.com/office/powerpoint/2010/main" xmlns="" val="315380917"/>
       </p:ext>
     </p:extLst>
   </p:cSld>
@@ -2736,7 +2758,8 @@
           <a:p>
             <a:fld id="{B4F56C3E-8310-43F1-8657-0BE50A775DA8}" type="datetimeFigureOut">
               <a:rPr lang="en-US" smtClean="0"/>
-              <a:t>12/10/2011</a:t>
+              <a:pPr/>
+              <a:t>12/11/2011</a:t>
             </a:fld>
             <a:endParaRPr lang="en-US"/>
           </a:p>
@@ -2814,6 +2837,7 @@
           <a:p>
             <a:fld id="{A0B17CF9-29C7-47E6-A9E3-BD947ED590AB}" type="slidenum">
               <a:rPr lang="en-US" smtClean="0"/>
+              <a:pPr/>
               <a:t>‹#›</a:t>
             </a:fld>
             <a:endParaRPr lang="en-US"/>
@@ -2823,7 +2847,7 @@
     </p:spTree>
     <p:extLst>
       <p:ext uri="{BB962C8B-B14F-4D97-AF65-F5344CB8AC3E}">
-        <p14:creationId xmlns:p14="http://schemas.microsoft.com/office/powerpoint/2010/main" val="59582196"/>
+        <p14:creationId xmlns:p14="http://schemas.microsoft.com/office/powerpoint/2010/main" xmlns="" val="59582196"/>
       </p:ext>
     </p:extLst>
   </p:cSld>
@@ -3236,10 +3260,10 @@
           <p:nvPr/>
         </p:nvPicPr>
         <p:blipFill>
-          <a:blip r:embed="rId2">
+          <a:blip r:embed="rId2" cstate="print">
             <a:extLst>
               <a:ext uri="{28A0092B-C50C-407E-A947-70E740481C1C}">
-                <a14:useLocalDpi xmlns:a14="http://schemas.microsoft.com/office/drawing/2010/main" val="0"/>
+                <a14:useLocalDpi xmlns:a14="http://schemas.microsoft.com/office/drawing/2010/main" xmlns="" val="0"/>
               </a:ext>
             </a:extLst>
           </a:blip>
@@ -3364,7 +3388,7 @@
     </p:spTree>
     <p:extLst>
       <p:ext uri="{BB962C8B-B14F-4D97-AF65-F5344CB8AC3E}">
-        <p14:creationId xmlns:p14="http://schemas.microsoft.com/office/powerpoint/2010/main" val="4141086430"/>
+        <p14:creationId xmlns:p14="http://schemas.microsoft.com/office/powerpoint/2010/main" xmlns="" val="4141086430"/>
       </p:ext>
     </p:extLst>
   </p:cSld>
@@ -3617,7 +3641,7 @@
           <a:blip r:embed="rId2" cstate="print">
             <a:extLst>
               <a:ext uri="{28A0092B-C50C-407E-A947-70E740481C1C}">
-                <a14:useLocalDpi xmlns:a14="http://schemas.microsoft.com/office/drawing/2010/main" val="0"/>
+                <a14:useLocalDpi xmlns:a14="http://schemas.microsoft.com/office/drawing/2010/main" xmlns="" val="0"/>
               </a:ext>
             </a:extLst>
           </a:blip>
@@ -4865,7 +4889,7 @@
     </p:spTree>
     <p:extLst>
       <p:ext uri="{BB962C8B-B14F-4D97-AF65-F5344CB8AC3E}">
-        <p14:creationId xmlns:p14="http://schemas.microsoft.com/office/powerpoint/2010/main" val="1975261220"/>
+        <p14:creationId xmlns:p14="http://schemas.microsoft.com/office/powerpoint/2010/main" xmlns="" val="1975261220"/>
       </p:ext>
     </p:extLst>
   </p:cSld>
@@ -5066,10 +5090,10 @@
           <p:nvPr/>
         </p:nvPicPr>
         <p:blipFill>
-          <a:blip r:embed="rId2">
+          <a:blip r:embed="rId2" cstate="print">
             <a:extLst>
               <a:ext uri="{28A0092B-C50C-407E-A947-70E740481C1C}">
-                <a14:useLocalDpi xmlns:a14="http://schemas.microsoft.com/office/drawing/2010/main" val="0"/>
+                <a14:useLocalDpi xmlns:a14="http://schemas.microsoft.com/office/drawing/2010/main" xmlns="" val="0"/>
               </a:ext>
             </a:extLst>
           </a:blip>
@@ -5096,10 +5120,10 @@
           <p:nvPr/>
         </p:nvPicPr>
         <p:blipFill>
-          <a:blip r:embed="rId3">
+          <a:blip r:embed="rId3" cstate="print">
             <a:extLst>
               <a:ext uri="{28A0092B-C50C-407E-A947-70E740481C1C}">
-                <a14:useLocalDpi xmlns:a14="http://schemas.microsoft.com/office/drawing/2010/main" val="0"/>
+                <a14:useLocalDpi xmlns:a14="http://schemas.microsoft.com/office/drawing/2010/main" xmlns="" val="0"/>
               </a:ext>
             </a:extLst>
           </a:blip>
@@ -5126,10 +5150,10 @@
           <p:nvPr/>
         </p:nvPicPr>
         <p:blipFill>
-          <a:blip r:embed="rId4">
+          <a:blip r:embed="rId4" cstate="print">
             <a:extLst>
               <a:ext uri="{28A0092B-C50C-407E-A947-70E740481C1C}">
-                <a14:useLocalDpi xmlns:a14="http://schemas.microsoft.com/office/drawing/2010/main" val="0"/>
+                <a14:useLocalDpi xmlns:a14="http://schemas.microsoft.com/office/drawing/2010/main" xmlns="" val="0"/>
               </a:ext>
             </a:extLst>
           </a:blip>
@@ -5150,7 +5174,7 @@
     </p:spTree>
     <p:extLst>
       <p:ext uri="{BB962C8B-B14F-4D97-AF65-F5344CB8AC3E}">
-        <p14:creationId xmlns:p14="http://schemas.microsoft.com/office/powerpoint/2010/main" val="3059610670"/>
+        <p14:creationId xmlns:p14="http://schemas.microsoft.com/office/powerpoint/2010/main" xmlns="" val="3059610670"/>
       </p:ext>
     </p:extLst>
   </p:cSld>
@@ -5327,14 +5351,7 @@
                 <a:latin typeface="Times New Roman" pitchFamily="18" charset="0"/>
                 <a:cs typeface="Times New Roman" pitchFamily="18" charset="0"/>
               </a:rPr>
-              <a:t>Each </a:t>
-            </a:r>
-            <a:r>
-              <a:rPr lang="en-US" sz="2400" dirty="0" smtClean="0">
-                <a:latin typeface="Times New Roman" pitchFamily="18" charset="0"/>
-                <a:cs typeface="Times New Roman" pitchFamily="18" charset="0"/>
-              </a:rPr>
-              <a:t>component answers fairly accurately for certain kinds of questions but not for others.</a:t>
+              <a:t>Each component answers fairly accurately for certain kinds of questions but not for others.</a:t>
             </a:r>
           </a:p>
           <a:p>
@@ -5344,21 +5361,7 @@
                 <a:latin typeface="Times New Roman" pitchFamily="18" charset="0"/>
                 <a:cs typeface="Times New Roman" pitchFamily="18" charset="0"/>
               </a:rPr>
-              <a:t>By combining the </a:t>
-            </a:r>
-            <a:r>
-              <a:rPr lang="en-US" sz="2000" dirty="0" smtClean="0">
-                <a:latin typeface="Times New Roman" pitchFamily="18" charset="0"/>
-                <a:cs typeface="Times New Roman" pitchFamily="18" charset="0"/>
-              </a:rPr>
-              <a:t>components, </a:t>
-            </a:r>
-            <a:r>
-              <a:rPr lang="en-US" sz="2000" dirty="0" smtClean="0">
-                <a:latin typeface="Times New Roman" pitchFamily="18" charset="0"/>
-                <a:cs typeface="Times New Roman" pitchFamily="18" charset="0"/>
-              </a:rPr>
-              <a:t>we can improve overall accuracy.</a:t>
+              <a:t>By combining the components, we can improve overall accuracy.</a:t>
             </a:r>
           </a:p>
           <a:p>
@@ -5533,10 +5536,10 @@
           <p:nvPr/>
         </p:nvPicPr>
         <p:blipFill>
-          <a:blip r:embed="rId2">
+          <a:blip r:embed="rId2" cstate="print">
             <a:extLst>
               <a:ext uri="{28A0092B-C50C-407E-A947-70E740481C1C}">
-                <a14:useLocalDpi xmlns:a14="http://schemas.microsoft.com/office/drawing/2010/main" val="0"/>
+                <a14:useLocalDpi xmlns:a14="http://schemas.microsoft.com/office/drawing/2010/main" xmlns="" val="0"/>
               </a:ext>
             </a:extLst>
           </a:blip>
@@ -5557,7 +5560,7 @@
     </p:spTree>
     <p:extLst>
       <p:ext uri="{BB962C8B-B14F-4D97-AF65-F5344CB8AC3E}">
-        <p14:creationId xmlns:p14="http://schemas.microsoft.com/office/powerpoint/2010/main" val="986917914"/>
+        <p14:creationId xmlns:p14="http://schemas.microsoft.com/office/powerpoint/2010/main" xmlns="" val="986917914"/>
       </p:ext>
     </p:extLst>
   </p:cSld>
@@ -6752,10 +6755,10 @@
           <p:nvPr/>
         </p:nvPicPr>
         <p:blipFill>
-          <a:blip r:embed="rId2">
+          <a:blip r:embed="rId2" cstate="print">
             <a:extLst>
               <a:ext uri="{28A0092B-C50C-407E-A947-70E740481C1C}">
-                <a14:useLocalDpi xmlns:a14="http://schemas.microsoft.com/office/drawing/2010/main" val="0"/>
+                <a14:useLocalDpi xmlns:a14="http://schemas.microsoft.com/office/drawing/2010/main" xmlns="" val="0"/>
               </a:ext>
             </a:extLst>
           </a:blip>
@@ -6776,7 +6779,7 @@
     </p:spTree>
     <p:extLst>
       <p:ext uri="{BB962C8B-B14F-4D97-AF65-F5344CB8AC3E}">
-        <p14:creationId xmlns:p14="http://schemas.microsoft.com/office/powerpoint/2010/main" val="3746091129"/>
+        <p14:creationId xmlns:p14="http://schemas.microsoft.com/office/powerpoint/2010/main" xmlns="" val="3746091129"/>
       </p:ext>
     </p:extLst>
   </p:cSld>
@@ -7102,10 +7105,10 @@
           <p:nvPr/>
         </p:nvPicPr>
         <p:blipFill>
-          <a:blip r:embed="rId2">
+          <a:blip r:embed="rId2" cstate="print">
             <a:extLst>
               <a:ext uri="{28A0092B-C50C-407E-A947-70E740481C1C}">
-                <a14:useLocalDpi xmlns:a14="http://schemas.microsoft.com/office/drawing/2010/main" val="0"/>
+                <a14:useLocalDpi xmlns:a14="http://schemas.microsoft.com/office/drawing/2010/main" xmlns="" val="0"/>
               </a:ext>
             </a:extLst>
           </a:blip>
@@ -7126,7 +7129,7 @@
     </p:spTree>
     <p:extLst>
       <p:ext uri="{BB962C8B-B14F-4D97-AF65-F5344CB8AC3E}">
-        <p14:creationId xmlns:p14="http://schemas.microsoft.com/office/powerpoint/2010/main" val="1343760258"/>
+        <p14:creationId xmlns:p14="http://schemas.microsoft.com/office/powerpoint/2010/main" xmlns="" val="1343760258"/>
       </p:ext>
     </p:extLst>
   </p:cSld>
@@ -7327,10 +7330,10 @@
           <p:nvPr/>
         </p:nvPicPr>
         <p:blipFill>
-          <a:blip r:embed="rId2">
+          <a:blip r:embed="rId2" cstate="print">
             <a:extLst>
               <a:ext uri="{28A0092B-C50C-407E-A947-70E740481C1C}">
-                <a14:useLocalDpi xmlns:a14="http://schemas.microsoft.com/office/drawing/2010/main" val="0"/>
+                <a14:useLocalDpi xmlns:a14="http://schemas.microsoft.com/office/drawing/2010/main" xmlns="" val="0"/>
               </a:ext>
             </a:extLst>
           </a:blip>
@@ -7357,10 +7360,10 @@
           <p:nvPr/>
         </p:nvPicPr>
         <p:blipFill>
-          <a:blip r:embed="rId3">
+          <a:blip r:embed="rId3" cstate="print">
             <a:extLst>
               <a:ext uri="{28A0092B-C50C-407E-A947-70E740481C1C}">
-                <a14:useLocalDpi xmlns:a14="http://schemas.microsoft.com/office/drawing/2010/main" val="0"/>
+                <a14:useLocalDpi xmlns:a14="http://schemas.microsoft.com/office/drawing/2010/main" xmlns="" val="0"/>
               </a:ext>
             </a:extLst>
           </a:blip>
@@ -7381,7 +7384,7 @@
     </p:spTree>
     <p:extLst>
       <p:ext uri="{BB962C8B-B14F-4D97-AF65-F5344CB8AC3E}">
-        <p14:creationId xmlns:p14="http://schemas.microsoft.com/office/powerpoint/2010/main" val="3797520296"/>
+        <p14:creationId xmlns:p14="http://schemas.microsoft.com/office/powerpoint/2010/main" xmlns="" val="3797520296"/>
       </p:ext>
     </p:extLst>
   </p:cSld>
@@ -7837,10 +7840,10 @@
           <p:nvPr/>
         </p:nvPicPr>
         <p:blipFill>
-          <a:blip r:embed="rId2">
+          <a:blip r:embed="rId2" cstate="print">
             <a:extLst>
               <a:ext uri="{28A0092B-C50C-407E-A947-70E740481C1C}">
-                <a14:useLocalDpi xmlns:a14="http://schemas.microsoft.com/office/drawing/2010/main" val="0"/>
+                <a14:useLocalDpi xmlns:a14="http://schemas.microsoft.com/office/drawing/2010/main" xmlns="" val="0"/>
               </a:ext>
             </a:extLst>
           </a:blip>
@@ -7861,7 +7864,7 @@
     </p:spTree>
     <p:extLst>
       <p:ext uri="{BB962C8B-B14F-4D97-AF65-F5344CB8AC3E}">
-        <p14:creationId xmlns:p14="http://schemas.microsoft.com/office/powerpoint/2010/main" val="1411260889"/>
+        <p14:creationId xmlns:p14="http://schemas.microsoft.com/office/powerpoint/2010/main" xmlns="" val="1411260889"/>
       </p:ext>
     </p:extLst>
   </p:cSld>
@@ -7925,17 +7928,7 @@
                 <a:latin typeface="Times New Roman" pitchFamily="18" charset="0"/>
                 <a:cs typeface="Times New Roman" pitchFamily="18" charset="0"/>
               </a:rPr>
-              <a:t>Bag of </a:t>
-            </a:r>
-            <a:r>
-              <a:rPr lang="en-US" sz="3200" dirty="0" smtClean="0">
-                <a:solidFill>
-                  <a:schemeClr val="tx2"/>
-                </a:solidFill>
-                <a:latin typeface="Times New Roman" pitchFamily="18" charset="0"/>
-                <a:cs typeface="Times New Roman" pitchFamily="18" charset="0"/>
-              </a:rPr>
-              <a:t>N-Grams</a:t>
+              <a:t>Bag of N-Grams</a:t>
             </a:r>
             <a:endParaRPr lang="en-US" sz="3200" dirty="0">
               <a:solidFill>
@@ -7983,7 +7976,23 @@
                 <a:latin typeface="Times New Roman" pitchFamily="18" charset="0"/>
                 <a:cs typeface="Times New Roman" pitchFamily="18" charset="0"/>
               </a:rPr>
-              <a:t>Strategy: rank sentences in terms of how many n-grams matched, not just individual words (unigrams)</a:t>
+              <a:t>Strategy: rank sentences in terms of how many n-grams matched, not just individual words (unigrams</a:t>
+            </a:r>
+            <a:r>
+              <a:rPr lang="en-US" sz="2400" dirty="0" smtClean="0">
+                <a:latin typeface="Times New Roman" pitchFamily="18" charset="0"/>
+                <a:cs typeface="Times New Roman" pitchFamily="18" charset="0"/>
+              </a:rPr>
+              <a:t>)</a:t>
+            </a:r>
+          </a:p>
+          <a:p>
+            <a:r>
+              <a:rPr lang="en-US" sz="2400" dirty="0" smtClean="0">
+                <a:latin typeface="Times New Roman" pitchFamily="18" charset="0"/>
+                <a:cs typeface="Times New Roman" pitchFamily="18" charset="0"/>
+              </a:rPr>
+              <a:t>Outperformed bag of words on some question types</a:t>
             </a:r>
             <a:endParaRPr lang="en-US" sz="2000" dirty="0" smtClean="0">
               <a:latin typeface="Times New Roman" pitchFamily="18" charset="0"/>
@@ -8134,7 +8143,7 @@
           <a:blip r:embed="rId2" cstate="print">
             <a:extLst>
               <a:ext uri="{28A0092B-C50C-407E-A947-70E740481C1C}">
-                <a14:useLocalDpi xmlns:a14="http://schemas.microsoft.com/office/drawing/2010/main" val="0"/>
+                <a14:useLocalDpi xmlns:a14="http://schemas.microsoft.com/office/drawing/2010/main" xmlns="" val="0"/>
               </a:ext>
             </a:extLst>
           </a:blip>
@@ -8155,7 +8164,7 @@
     </p:spTree>
     <p:extLst>
       <p:ext uri="{BB962C8B-B14F-4D97-AF65-F5344CB8AC3E}">
-        <p14:creationId xmlns:p14="http://schemas.microsoft.com/office/powerpoint/2010/main" val="1959210557"/>
+        <p14:creationId xmlns:p14="http://schemas.microsoft.com/office/powerpoint/2010/main" xmlns="" val="1959210557"/>
       </p:ext>
     </p:extLst>
   </p:cSld>
@@ -8484,7 +8493,7 @@
           <a:blip r:embed="rId2" cstate="print">
             <a:extLst>
               <a:ext uri="{28A0092B-C50C-407E-A947-70E740481C1C}">
-                <a14:useLocalDpi xmlns:a14="http://schemas.microsoft.com/office/drawing/2010/main" val="0"/>
+                <a14:useLocalDpi xmlns:a14="http://schemas.microsoft.com/office/drawing/2010/main" xmlns="" val="0"/>
               </a:ext>
             </a:extLst>
           </a:blip>
@@ -8505,7 +8514,7 @@
     </p:spTree>
     <p:extLst>
       <p:ext uri="{BB962C8B-B14F-4D97-AF65-F5344CB8AC3E}">
-        <p14:creationId xmlns:p14="http://schemas.microsoft.com/office/powerpoint/2010/main" val="4144508660"/>
+        <p14:creationId xmlns:p14="http://schemas.microsoft.com/office/powerpoint/2010/main" xmlns="" val="4144508660"/>
       </p:ext>
     </p:extLst>
   </p:cSld>
@@ -8657,8 +8666,28 @@
                 <a:latin typeface="Times New Roman" pitchFamily="18" charset="0"/>
                 <a:cs typeface="Times New Roman" pitchFamily="18" charset="0"/>
               </a:rPr>
-              <a:t>Uses pre-trained “muc.7class.distsim.crf” model provided with Stanford parser</a:t>
-            </a:r>
+              <a:t>Uses pre-trained “muc.7class.distsim.crf” model provided with Stanford </a:t>
+            </a:r>
+            <a:r>
+              <a:rPr lang="en-US" sz="2000" dirty="0" smtClean="0">
+                <a:latin typeface="Times New Roman" pitchFamily="18" charset="0"/>
+                <a:cs typeface="Times New Roman" pitchFamily="18" charset="0"/>
+              </a:rPr>
+              <a:t>parser</a:t>
+            </a:r>
+          </a:p>
+          <a:p>
+            <a:r>
+              <a:rPr lang="en-US" sz="2400" dirty="0" smtClean="0">
+                <a:latin typeface="Times New Roman" pitchFamily="18" charset="0"/>
+                <a:cs typeface="Times New Roman" pitchFamily="18" charset="0"/>
+              </a:rPr>
+              <a:t>Overall, not too useful (low recall)</a:t>
+            </a:r>
+            <a:endParaRPr lang="en-US" sz="2400" dirty="0" smtClean="0">
+              <a:latin typeface="Times New Roman" pitchFamily="18" charset="0"/>
+              <a:cs typeface="Times New Roman" pitchFamily="18" charset="0"/>
+            </a:endParaRPr>
           </a:p>
           <a:p>
             <a:pPr lvl="1"/>
@@ -8797,7 +8826,7 @@
           <a:blip r:embed="rId2" cstate="print">
             <a:extLst>
               <a:ext uri="{28A0092B-C50C-407E-A947-70E740481C1C}">
-                <a14:useLocalDpi xmlns:a14="http://schemas.microsoft.com/office/drawing/2010/main" val="0"/>
+                <a14:useLocalDpi xmlns:a14="http://schemas.microsoft.com/office/drawing/2010/main" xmlns="" val="0"/>
               </a:ext>
             </a:extLst>
           </a:blip>
@@ -8818,7 +8847,7 @@
     </p:spTree>
     <p:extLst>
       <p:ext uri="{BB962C8B-B14F-4D97-AF65-F5344CB8AC3E}">
-        <p14:creationId xmlns:p14="http://schemas.microsoft.com/office/powerpoint/2010/main" val="3922488265"/>
+        <p14:creationId xmlns:p14="http://schemas.microsoft.com/office/powerpoint/2010/main" xmlns="" val="3922488265"/>
       </p:ext>
     </p:extLst>
   </p:cSld>
@@ -9139,10 +9168,10 @@
           <p:nvPr/>
         </p:nvPicPr>
         <p:blipFill>
-          <a:blip r:embed="rId2">
+          <a:blip r:embed="rId2" cstate="print">
             <a:extLst>
               <a:ext uri="{28A0092B-C50C-407E-A947-70E740481C1C}">
-                <a14:useLocalDpi xmlns:a14="http://schemas.microsoft.com/office/drawing/2010/main" val="0"/>
+                <a14:useLocalDpi xmlns:a14="http://schemas.microsoft.com/office/drawing/2010/main" xmlns="" val="0"/>
               </a:ext>
             </a:extLst>
           </a:blip>
@@ -9163,7 +9192,7 @@
     </p:spTree>
     <p:extLst>
       <p:ext uri="{BB962C8B-B14F-4D97-AF65-F5344CB8AC3E}">
-        <p14:creationId xmlns:p14="http://schemas.microsoft.com/office/powerpoint/2010/main" val="785206079"/>
+        <p14:creationId xmlns:p14="http://schemas.microsoft.com/office/powerpoint/2010/main" xmlns="" val="785206079"/>
       </p:ext>
     </p:extLst>
   </p:cSld>
@@ -9394,19 +9423,8 @@
                 <a:latin typeface="Times New Roman" pitchFamily="18" charset="0"/>
                 <a:cs typeface="Times New Roman" pitchFamily="18" charset="0"/>
               </a:rPr>
-              <a:t> [2], </a:t>
-            </a:r>
-            <a:r>
-              <a:rPr lang="en-US" sz="2400" dirty="0" smtClean="0">
-                <a:latin typeface="Times New Roman" pitchFamily="18" charset="0"/>
-                <a:cs typeface="Times New Roman" pitchFamily="18" charset="0"/>
-              </a:rPr>
-              <a:t>[8]</a:t>
-            </a:r>
-            <a:endParaRPr lang="en-US" sz="2400" dirty="0" smtClean="0">
-              <a:latin typeface="Times New Roman" pitchFamily="18" charset="0"/>
-              <a:cs typeface="Times New Roman" pitchFamily="18" charset="0"/>
-            </a:endParaRPr>
+              <a:t> [2], [8]</a:t>
+            </a:r>
           </a:p>
           <a:p>
             <a:pPr lvl="1"/>
@@ -9542,10 +9560,10 @@
           <p:nvPr/>
         </p:nvPicPr>
         <p:blipFill>
-          <a:blip r:embed="rId2">
+          <a:blip r:embed="rId2" cstate="print">
             <a:extLst>
               <a:ext uri="{28A0092B-C50C-407E-A947-70E740481C1C}">
-                <a14:useLocalDpi xmlns:a14="http://schemas.microsoft.com/office/drawing/2010/main" val="0"/>
+                <a14:useLocalDpi xmlns:a14="http://schemas.microsoft.com/office/drawing/2010/main" xmlns="" val="0"/>
               </a:ext>
             </a:extLst>
           </a:blip>
@@ -9566,7 +9584,7 @@
     </p:spTree>
     <p:extLst>
       <p:ext uri="{BB962C8B-B14F-4D97-AF65-F5344CB8AC3E}">
-        <p14:creationId xmlns:p14="http://schemas.microsoft.com/office/powerpoint/2010/main" val="1986848281"/>
+        <p14:creationId xmlns:p14="http://schemas.microsoft.com/office/powerpoint/2010/main" xmlns="" val="1986848281"/>
       </p:ext>
     </p:extLst>
   </p:cSld>

</xml_diff>